<commit_message>
Added slide for Support Modules
</commit_message>
<xml_diff>
--- a/A Brief Introduction to The Puppet Forge.pptx
+++ b/A Brief Introduction to The Puppet Forge.pptx
@@ -5,7 +5,7 @@
     <p:sldMasterId id="2147483840" r:id="rId1"/>
   </p:sldMasterIdLst>
   <p:notesMasterIdLst>
-    <p:notesMasterId r:id="rId26"/>
+    <p:notesMasterId r:id="rId28"/>
   </p:notesMasterIdLst>
   <p:sldIdLst>
     <p:sldId id="283" r:id="rId2"/>
@@ -14,24 +14,26 @@
     <p:sldId id="275" r:id="rId5"/>
     <p:sldId id="264" r:id="rId6"/>
     <p:sldId id="266" r:id="rId7"/>
-    <p:sldId id="269" r:id="rId8"/>
-    <p:sldId id="260" r:id="rId9"/>
-    <p:sldId id="272" r:id="rId10"/>
-    <p:sldId id="261" r:id="rId11"/>
-    <p:sldId id="271" r:id="rId12"/>
-    <p:sldId id="262" r:id="rId13"/>
-    <p:sldId id="281" r:id="rId14"/>
-    <p:sldId id="263" r:id="rId15"/>
-    <p:sldId id="267" r:id="rId16"/>
-    <p:sldId id="276" r:id="rId17"/>
-    <p:sldId id="277" r:id="rId18"/>
-    <p:sldId id="278" r:id="rId19"/>
-    <p:sldId id="280" r:id="rId20"/>
-    <p:sldId id="274" r:id="rId21"/>
-    <p:sldId id="270" r:id="rId22"/>
-    <p:sldId id="273" r:id="rId23"/>
-    <p:sldId id="282" r:id="rId24"/>
-    <p:sldId id="268" r:id="rId25"/>
+    <p:sldId id="284" r:id="rId8"/>
+    <p:sldId id="285" r:id="rId9"/>
+    <p:sldId id="269" r:id="rId10"/>
+    <p:sldId id="260" r:id="rId11"/>
+    <p:sldId id="272" r:id="rId12"/>
+    <p:sldId id="261" r:id="rId13"/>
+    <p:sldId id="271" r:id="rId14"/>
+    <p:sldId id="262" r:id="rId15"/>
+    <p:sldId id="281" r:id="rId16"/>
+    <p:sldId id="263" r:id="rId17"/>
+    <p:sldId id="267" r:id="rId18"/>
+    <p:sldId id="276" r:id="rId19"/>
+    <p:sldId id="277" r:id="rId20"/>
+    <p:sldId id="278" r:id="rId21"/>
+    <p:sldId id="280" r:id="rId22"/>
+    <p:sldId id="274" r:id="rId23"/>
+    <p:sldId id="270" r:id="rId24"/>
+    <p:sldId id="273" r:id="rId25"/>
+    <p:sldId id="282" r:id="rId26"/>
+    <p:sldId id="268" r:id="rId27"/>
   </p:sldIdLst>
   <p:sldSz cx="12192000" cy="6858000"/>
   <p:notesSz cx="6858000" cy="9144000"/>
@@ -1070,7 +1072,7 @@
           <a:p>
             <a:fld id="{3962DC8A-4178-4581-8961-B616D14AAA3E}" type="slidenum">
               <a:rPr lang="en-US" smtClean="0"/>
-              <a:t>7</a:t>
+              <a:t>9</a:t>
             </a:fld>
             <a:endParaRPr lang="en-US"/>
           </a:p>
@@ -1168,7 +1170,7 @@
           <a:p>
             <a:fld id="{3962DC8A-4178-4581-8961-B616D14AAA3E}" type="slidenum">
               <a:rPr lang="en-US" smtClean="0"/>
-              <a:t>8</a:t>
+              <a:t>10</a:t>
             </a:fld>
             <a:endParaRPr lang="en-US"/>
           </a:p>
@@ -1252,7 +1254,7 @@
           <a:p>
             <a:fld id="{3962DC8A-4178-4581-8961-B616D14AAA3E}" type="slidenum">
               <a:rPr lang="en-US" smtClean="0"/>
-              <a:t>15</a:t>
+              <a:t>17</a:t>
             </a:fld>
             <a:endParaRPr lang="en-US"/>
           </a:p>
@@ -1336,7 +1338,7 @@
           <a:p>
             <a:fld id="{3962DC8A-4178-4581-8961-B616D14AAA3E}" type="slidenum">
               <a:rPr lang="en-US" smtClean="0"/>
-              <a:t>17</a:t>
+              <a:t>19</a:t>
             </a:fld>
             <a:endParaRPr lang="en-US"/>
           </a:p>
@@ -4724,7 +4726,7 @@
           <a:p>
             <a:r>
               <a:rPr lang="en-US" dirty="0" smtClean="0"/>
-              <a:t>Install Modules</a:t>
+              <a:t>Find Modules</a:t>
             </a:r>
             <a:endParaRPr lang="en-US" dirty="0"/>
           </a:p>
@@ -4743,178 +4745,67 @@
         <p:spPr/>
         <p:txBody>
           <a:bodyPr>
-            <a:noAutofit/>
+            <a:normAutofit/>
           </a:bodyPr>
           <a:lstStyle/>
           <a:p>
-            <a:r>
-              <a:rPr lang="en-US" b="1" baseline="0" dirty="0" smtClean="0">
+            <a:pPr marL="0" indent="0">
+              <a:buNone/>
+            </a:pPr>
+            <a:r>
+              <a:rPr lang="en-US" sz="3200" b="1" dirty="0" smtClean="0"/>
+              <a:t>Search the Puppet Forge from the command line too:</a:t>
+            </a:r>
+          </a:p>
+          <a:p>
+            <a:pPr marL="0" indent="0">
+              <a:buNone/>
+            </a:pPr>
+            <a:r>
+              <a:rPr lang="en-US" sz="3200" b="1" dirty="0">
                 <a:latin typeface="Courier New" panose="02070309020205020404" pitchFamily="49" charset="0"/>
-              </a:rPr>
-              <a:t>#</a:t>
-            </a:r>
-            <a:r>
-              <a:rPr lang="en-US" b="1" dirty="0" smtClean="0">
+                <a:cs typeface="Courier New" panose="02070309020205020404" pitchFamily="49" charset="0"/>
+              </a:rPr>
+              <a:t>	</a:t>
+            </a:r>
+            <a:r>
+              <a:rPr lang="en-US" sz="3200" b="1" dirty="0" smtClean="0">
                 <a:latin typeface="Courier New" panose="02070309020205020404" pitchFamily="49" charset="0"/>
-              </a:rPr>
-              <a:t> puppet module install </a:t>
-            </a:r>
-            <a:r>
-              <a:rPr lang="en-US" b="1" dirty="0" err="1" smtClean="0">
-                <a:latin typeface="Courier New" panose="02070309020205020404" pitchFamily="49" charset="0"/>
-              </a:rPr>
-              <a:t>puppetlabs</a:t>
-            </a:r>
-            <a:r>
-              <a:rPr lang="en-US" b="1" dirty="0" smtClean="0">
-                <a:latin typeface="Courier New" panose="02070309020205020404" pitchFamily="49" charset="0"/>
-              </a:rPr>
-              <a:t>-apache</a:t>
-            </a:r>
-          </a:p>
-          <a:p>
-            <a:r>
-              <a:rPr lang="en-US" b="1" dirty="0">
-                <a:latin typeface="Courier New" panose="02070309020205020404" pitchFamily="49" charset="0"/>
-              </a:rPr>
-              <a:t>Notice: Preparing to install into /</a:t>
-            </a:r>
-            <a:r>
-              <a:rPr lang="en-US" b="1" dirty="0" err="1" smtClean="0">
-                <a:latin typeface="Courier New" panose="02070309020205020404" pitchFamily="49" charset="0"/>
-              </a:rPr>
-              <a:t>etc</a:t>
-            </a:r>
-            <a:r>
-              <a:rPr lang="en-US" b="1" dirty="0" smtClean="0">
-                <a:latin typeface="Courier New" panose="02070309020205020404" pitchFamily="49" charset="0"/>
-              </a:rPr>
-              <a:t>/puppet/modules</a:t>
-            </a:r>
-          </a:p>
-          <a:p>
-            <a:r>
-              <a:rPr lang="en-US" b="1" dirty="0" smtClean="0">
-                <a:latin typeface="Courier New" panose="02070309020205020404" pitchFamily="49" charset="0"/>
-              </a:rPr>
-              <a:t>Notice</a:t>
-            </a:r>
-            <a:r>
-              <a:rPr lang="en-US" b="1" dirty="0">
-                <a:latin typeface="Courier New" panose="02070309020205020404" pitchFamily="49" charset="0"/>
-              </a:rPr>
-              <a:t>: Downloading from https://</a:t>
-            </a:r>
-            <a:r>
-              <a:rPr lang="en-US" b="1" dirty="0" smtClean="0">
-                <a:latin typeface="Courier New" panose="02070309020205020404" pitchFamily="49" charset="0"/>
-              </a:rPr>
-              <a:t>forgeapi.puppetlabs.com</a:t>
-            </a:r>
-          </a:p>
-          <a:p>
-            <a:r>
-              <a:rPr lang="en-US" b="1" dirty="0" smtClean="0">
-                <a:latin typeface="Courier New" panose="02070309020205020404" pitchFamily="49" charset="0"/>
-              </a:rPr>
-              <a:t>Notice</a:t>
-            </a:r>
-            <a:r>
-              <a:rPr lang="en-US" b="1" dirty="0">
-                <a:latin typeface="Courier New" panose="02070309020205020404" pitchFamily="49" charset="0"/>
-              </a:rPr>
-              <a:t>: Installing -- do not interrupt ...</a:t>
-            </a:r>
-          </a:p>
-          <a:p>
-            <a:r>
-              <a:rPr lang="en-US" b="1" dirty="0">
-                <a:latin typeface="Courier New" panose="02070309020205020404" pitchFamily="49" charset="0"/>
-              </a:rPr>
-              <a:t>/</a:t>
-            </a:r>
-            <a:r>
-              <a:rPr lang="en-US" b="1" dirty="0" err="1">
-                <a:latin typeface="Courier New" panose="02070309020205020404" pitchFamily="49" charset="0"/>
-              </a:rPr>
-              <a:t>etc</a:t>
-            </a:r>
-            <a:r>
-              <a:rPr lang="en-US" b="1" dirty="0">
-                <a:latin typeface="Courier New" panose="02070309020205020404" pitchFamily="49" charset="0"/>
-              </a:rPr>
-              <a:t>/puppet/modules</a:t>
-            </a:r>
-          </a:p>
-          <a:p>
-            <a:r>
-              <a:rPr lang="en-US" b="1" dirty="0">
-                <a:latin typeface="Courier New" panose="02070309020205020404" pitchFamily="49" charset="0"/>
-              </a:rPr>
-              <a:t>└─┬ </a:t>
-            </a:r>
-            <a:r>
-              <a:rPr lang="en-US" b="1" dirty="0" err="1">
-                <a:latin typeface="Courier New" panose="02070309020205020404" pitchFamily="49" charset="0"/>
-              </a:rPr>
-              <a:t>puppetlabs</a:t>
-            </a:r>
-            <a:r>
-              <a:rPr lang="en-US" b="1" dirty="0">
-                <a:latin typeface="Courier New" panose="02070309020205020404" pitchFamily="49" charset="0"/>
-              </a:rPr>
-              <a:t>-apache (v1.1.0)</a:t>
-            </a:r>
-          </a:p>
-          <a:p>
-            <a:r>
-              <a:rPr lang="en-US" b="1" dirty="0">
-                <a:latin typeface="Courier New" panose="02070309020205020404" pitchFamily="49" charset="0"/>
-              </a:rPr>
-              <a:t>  ├── </a:t>
-            </a:r>
-            <a:r>
-              <a:rPr lang="en-US" b="1" dirty="0" err="1">
-                <a:latin typeface="Courier New" panose="02070309020205020404" pitchFamily="49" charset="0"/>
-              </a:rPr>
-              <a:t>puppetlabs-concat</a:t>
-            </a:r>
-            <a:r>
-              <a:rPr lang="en-US" b="1" dirty="0">
-                <a:latin typeface="Courier New" panose="02070309020205020404" pitchFamily="49" charset="0"/>
-              </a:rPr>
-              <a:t> (v1.1.0)</a:t>
-            </a:r>
-          </a:p>
-          <a:p>
-            <a:r>
-              <a:rPr lang="en-US" b="1" dirty="0">
-                <a:latin typeface="Courier New" panose="02070309020205020404" pitchFamily="49" charset="0"/>
-              </a:rPr>
-              <a:t>  └── </a:t>
-            </a:r>
-            <a:r>
-              <a:rPr lang="en-US" b="1" dirty="0" err="1">
-                <a:latin typeface="Courier New" panose="02070309020205020404" pitchFamily="49" charset="0"/>
-              </a:rPr>
-              <a:t>puppetlabs-stdlib</a:t>
-            </a:r>
-            <a:r>
-              <a:rPr lang="en-US" b="1" dirty="0">
-                <a:latin typeface="Courier New" panose="02070309020205020404" pitchFamily="49" charset="0"/>
-              </a:rPr>
-              <a:t> (v4.2.2)</a:t>
-            </a:r>
-          </a:p>
-          <a:p>
-            <a:endParaRPr lang="en-US" b="1" baseline="0" dirty="0" smtClean="0"/>
-          </a:p>
-        </p:txBody>
-      </p:sp>
+                <a:cs typeface="Courier New" panose="02070309020205020404" pitchFamily="49" charset="0"/>
+              </a:rPr>
+              <a:t>$ puppet module search apache</a:t>
+            </a:r>
+          </a:p>
+        </p:txBody>
+      </p:sp>
+      <p:pic>
+        <p:nvPicPr>
+          <p:cNvPr id="5" name="Picture 4"/>
+          <p:cNvPicPr>
+            <a:picLocks noChangeAspect="1"/>
+          </p:cNvPicPr>
+          <p:nvPr/>
+        </p:nvPicPr>
+        <p:blipFill>
+          <a:blip r:embed="rId3"/>
+          <a:stretch>
+            <a:fillRect/>
+          </a:stretch>
+        </p:blipFill>
+        <p:spPr>
+          <a:xfrm>
+            <a:off x="687952" y="3429000"/>
+            <a:ext cx="10711317" cy="2117671"/>
+          </a:xfrm>
+          <a:prstGeom prst="rect">
+            <a:avLst/>
+          </a:prstGeom>
+        </p:spPr>
+      </p:pic>
     </p:spTree>
     <p:extLst>
       <p:ext uri="{BB962C8B-B14F-4D97-AF65-F5344CB8AC3E}">
-        <p14:creationId xmlns:p14="http://schemas.microsoft.com/office/powerpoint/2010/main" val="1905540571"/>
+        <p14:creationId xmlns:p14="http://schemas.microsoft.com/office/powerpoint/2010/main" val="482773262"/>
       </p:ext>
     </p:extLst>
   </p:cSld>
@@ -4981,164 +4872,93 @@
             <p:ph idx="1"/>
           </p:nvPr>
         </p:nvSpPr>
-        <p:spPr>
-          <a:xfrm>
-            <a:off x="676656" y="2011680"/>
-            <a:ext cx="10753725" cy="4215699"/>
-          </a:xfrm>
-        </p:spPr>
+        <p:spPr/>
         <p:txBody>
           <a:bodyPr>
-            <a:noAutofit/>
+            <a:normAutofit/>
           </a:bodyPr>
           <a:lstStyle/>
           <a:p>
-            <a:r>
-              <a:rPr lang="en-US" sz="3200" b="1" dirty="0" smtClean="0">
-                <a:cs typeface="Courier New" panose="02070309020205020404" pitchFamily="49" charset="0"/>
-              </a:rPr>
-              <a:t>Display the modules that are installed with “module list”</a:t>
-            </a:r>
-          </a:p>
-          <a:p>
-            <a:endParaRPr lang="en-US" b="1" dirty="0">
-              <a:latin typeface="Courier New" panose="02070309020205020404" pitchFamily="49" charset="0"/>
-              <a:cs typeface="Courier New" panose="02070309020205020404" pitchFamily="49" charset="0"/>
-            </a:endParaRPr>
-          </a:p>
-          <a:p>
-            <a:r>
-              <a:rPr lang="en-US" b="1" dirty="0" smtClean="0">
+            <a:pPr marL="0" indent="0">
+              <a:buNone/>
+            </a:pPr>
+            <a:r>
+              <a:rPr lang="en-US" sz="3200" b="1" dirty="0" smtClean="0"/>
+              <a:t>Use the puppet command with “module install &lt;module name&gt;”</a:t>
+            </a:r>
+          </a:p>
+          <a:p>
+            <a:pPr marL="0" indent="0">
+              <a:buNone/>
+            </a:pPr>
+            <a:r>
+              <a:rPr lang="en-US" sz="2800" b="1" dirty="0" smtClean="0">
                 <a:latin typeface="Courier New" panose="02070309020205020404" pitchFamily="49" charset="0"/>
                 <a:cs typeface="Courier New" panose="02070309020205020404" pitchFamily="49" charset="0"/>
               </a:rPr>
-              <a:t># puppet module list</a:t>
-            </a:r>
-          </a:p>
-          <a:p>
-            <a:r>
-              <a:rPr lang="en-US" b="1" dirty="0">
+              <a:t>	# puppet module install </a:t>
+            </a:r>
+            <a:r>
+              <a:rPr lang="en-US" sz="2800" b="1" dirty="0" err="1" smtClean="0">
                 <a:latin typeface="Courier New" panose="02070309020205020404" pitchFamily="49" charset="0"/>
                 <a:cs typeface="Courier New" panose="02070309020205020404" pitchFamily="49" charset="0"/>
               </a:rPr>
-              <a:t>/</a:t>
-            </a:r>
-            <a:r>
-              <a:rPr lang="en-US" b="1" dirty="0" err="1">
+              <a:t>puppetlabs</a:t>
+            </a:r>
+            <a:r>
+              <a:rPr lang="en-US" sz="2800" b="1" dirty="0" smtClean="0">
                 <a:latin typeface="Courier New" panose="02070309020205020404" pitchFamily="49" charset="0"/>
                 <a:cs typeface="Courier New" panose="02070309020205020404" pitchFamily="49" charset="0"/>
               </a:rPr>
+              <a:t>-apache</a:t>
+            </a:r>
+          </a:p>
+          <a:p>
+            <a:endParaRPr lang="en-US" sz="3200" b="1" dirty="0" smtClean="0"/>
+          </a:p>
+          <a:p>
+            <a:pPr marL="0" indent="0">
+              <a:buNone/>
+            </a:pPr>
+            <a:r>
+              <a:rPr lang="en-US" sz="3200" b="1" dirty="0" smtClean="0"/>
+              <a:t>Installation locations:</a:t>
+            </a:r>
+            <a:endParaRPr lang="en-US" sz="3200" b="1" dirty="0"/>
+          </a:p>
+          <a:p>
+            <a:pPr marL="4572" lvl="1" indent="0">
+              <a:buNone/>
+            </a:pPr>
+            <a:r>
+              <a:rPr lang="en-US" sz="3200" b="1" dirty="0" smtClean="0"/>
+              <a:t>	Root – /</a:t>
+            </a:r>
+            <a:r>
+              <a:rPr lang="en-US" sz="3200" b="1" dirty="0" err="1" smtClean="0"/>
               <a:t>etc</a:t>
             </a:r>
             <a:r>
-              <a:rPr lang="en-US" b="1" dirty="0">
-                <a:latin typeface="Courier New" panose="02070309020205020404" pitchFamily="49" charset="0"/>
-                <a:cs typeface="Courier New" panose="02070309020205020404" pitchFamily="49" charset="0"/>
-              </a:rPr>
+              <a:rPr lang="en-US" sz="3200" b="1" dirty="0" smtClean="0"/>
               <a:t>/puppet/modules</a:t>
             </a:r>
           </a:p>
           <a:p>
-            <a:r>
-              <a:rPr lang="en-US" b="1" dirty="0">
-                <a:latin typeface="Courier New" panose="02070309020205020404" pitchFamily="49" charset="0"/>
-                <a:cs typeface="Courier New" panose="02070309020205020404" pitchFamily="49" charset="0"/>
-              </a:rPr>
-              <a:t>├── </a:t>
-            </a:r>
-            <a:r>
-              <a:rPr lang="en-US" b="1" dirty="0" err="1">
-                <a:latin typeface="Courier New" panose="02070309020205020404" pitchFamily="49" charset="0"/>
-                <a:cs typeface="Courier New" panose="02070309020205020404" pitchFamily="49" charset="0"/>
-              </a:rPr>
-              <a:t>puppetlabs</a:t>
-            </a:r>
-            <a:r>
-              <a:rPr lang="en-US" b="1" dirty="0">
-                <a:latin typeface="Courier New" panose="02070309020205020404" pitchFamily="49" charset="0"/>
-                <a:cs typeface="Courier New" panose="02070309020205020404" pitchFamily="49" charset="0"/>
-              </a:rPr>
-              <a:t>-apache (v1.1.0)</a:t>
-            </a:r>
-          </a:p>
-          <a:p>
-            <a:r>
-              <a:rPr lang="en-US" b="1" dirty="0">
-                <a:latin typeface="Courier New" panose="02070309020205020404" pitchFamily="49" charset="0"/>
-                <a:cs typeface="Courier New" panose="02070309020205020404" pitchFamily="49" charset="0"/>
-              </a:rPr>
-              <a:t>├── </a:t>
-            </a:r>
-            <a:r>
-              <a:rPr lang="en-US" b="1" dirty="0" err="1">
-                <a:latin typeface="Courier New" panose="02070309020205020404" pitchFamily="49" charset="0"/>
-                <a:cs typeface="Courier New" panose="02070309020205020404" pitchFamily="49" charset="0"/>
-              </a:rPr>
-              <a:t>puppetlabs-concat</a:t>
-            </a:r>
-            <a:r>
-              <a:rPr lang="en-US" b="1" dirty="0">
-                <a:latin typeface="Courier New" panose="02070309020205020404" pitchFamily="49" charset="0"/>
-                <a:cs typeface="Courier New" panose="02070309020205020404" pitchFamily="49" charset="0"/>
-              </a:rPr>
-              <a:t> (v1.1.0)</a:t>
-            </a:r>
-          </a:p>
-          <a:p>
-            <a:r>
-              <a:rPr lang="en-US" b="1" dirty="0">
-                <a:latin typeface="Courier New" panose="02070309020205020404" pitchFamily="49" charset="0"/>
-                <a:cs typeface="Courier New" panose="02070309020205020404" pitchFamily="49" charset="0"/>
-              </a:rPr>
-              <a:t>├── </a:t>
-            </a:r>
-            <a:r>
-              <a:rPr lang="en-US" b="1" dirty="0" err="1">
-                <a:latin typeface="Courier New" panose="02070309020205020404" pitchFamily="49" charset="0"/>
-                <a:cs typeface="Courier New" panose="02070309020205020404" pitchFamily="49" charset="0"/>
-              </a:rPr>
-              <a:t>puppetlabs-stdlib</a:t>
-            </a:r>
-            <a:r>
-              <a:rPr lang="en-US" b="1" dirty="0">
-                <a:latin typeface="Courier New" panose="02070309020205020404" pitchFamily="49" charset="0"/>
-                <a:cs typeface="Courier New" panose="02070309020205020404" pitchFamily="49" charset="0"/>
-              </a:rPr>
-              <a:t> (v4.2.2)</a:t>
-            </a:r>
-          </a:p>
-          <a:p>
-            <a:r>
-              <a:rPr lang="en-US" b="1" dirty="0">
-                <a:latin typeface="Courier New" panose="02070309020205020404" pitchFamily="49" charset="0"/>
-                <a:cs typeface="Courier New" panose="02070309020205020404" pitchFamily="49" charset="0"/>
-              </a:rPr>
-              <a:t>└── </a:t>
-            </a:r>
-            <a:r>
-              <a:rPr lang="en-US" b="1" dirty="0" err="1">
-                <a:latin typeface="Courier New" panose="02070309020205020404" pitchFamily="49" charset="0"/>
-                <a:cs typeface="Courier New" panose="02070309020205020404" pitchFamily="49" charset="0"/>
-              </a:rPr>
-              <a:t>puppetlabs-vcsrepo</a:t>
-            </a:r>
-            <a:r>
-              <a:rPr lang="en-US" b="1" dirty="0">
-                <a:latin typeface="Courier New" panose="02070309020205020404" pitchFamily="49" charset="0"/>
-                <a:cs typeface="Courier New" panose="02070309020205020404" pitchFamily="49" charset="0"/>
-              </a:rPr>
-              <a:t> (v1.0.2)</a:t>
-            </a:r>
-          </a:p>
-          <a:p>
-            <a:endParaRPr lang="en-US" b="1" dirty="0"/>
+            <a:pPr marL="0" indent="0">
+              <a:buNone/>
+            </a:pPr>
+            <a:r>
+              <a:rPr lang="en-US" sz="3200" b="1" dirty="0" smtClean="0"/>
+              <a:t>	User – /home/username/.puppet/modules</a:t>
+            </a:r>
+            <a:endParaRPr lang="en-US" sz="3200" b="1" dirty="0"/>
           </a:p>
         </p:txBody>
       </p:sp>
     </p:spTree>
     <p:extLst>
       <p:ext uri="{BB962C8B-B14F-4D97-AF65-F5344CB8AC3E}">
-        <p14:creationId xmlns:p14="http://schemas.microsoft.com/office/powerpoint/2010/main" val="2973901822"/>
+        <p14:creationId xmlns:p14="http://schemas.microsoft.com/office/powerpoint/2010/main" val="3085457245"/>
       </p:ext>
     </p:extLst>
   </p:cSld>
@@ -5189,7 +5009,7 @@
           <a:p>
             <a:r>
               <a:rPr lang="en-US" dirty="0" smtClean="0"/>
-              <a:t>Apply Modules</a:t>
+              <a:t>Install Modules</a:t>
             </a:r>
             <a:endParaRPr lang="en-US" dirty="0"/>
           </a:p>
@@ -5205,246 +5025,181 @@
             <p:ph idx="1"/>
           </p:nvPr>
         </p:nvSpPr>
-        <p:spPr>
-          <a:xfrm>
-            <a:off x="676656" y="2011680"/>
-            <a:ext cx="10753725" cy="4373354"/>
-          </a:xfrm>
-        </p:spPr>
+        <p:spPr/>
         <p:txBody>
           <a:bodyPr>
             <a:noAutofit/>
           </a:bodyPr>
           <a:lstStyle/>
           <a:p>
-            <a:pPr marL="0" indent="0">
-              <a:buNone/>
-            </a:pPr>
-            <a:r>
-              <a:rPr lang="en-US" sz="3200" b="1" dirty="0" smtClean="0"/>
-              <a:t>Call out installed modules in a puppet manifest</a:t>
-            </a:r>
-          </a:p>
-          <a:p>
-            <a:pPr marL="0" indent="0">
-              <a:buNone/>
-            </a:pPr>
-            <a:r>
-              <a:rPr lang="en-US" sz="3200" b="1" dirty="0" smtClean="0">
+            <a:r>
+              <a:rPr lang="en-US" b="1" baseline="0" dirty="0" smtClean="0">
                 <a:latin typeface="Courier New" panose="02070309020205020404" pitchFamily="49" charset="0"/>
-                <a:cs typeface="Courier New" panose="02070309020205020404" pitchFamily="49" charset="0"/>
-              </a:rPr>
-              <a:t>$ vi apache-</a:t>
-            </a:r>
-            <a:r>
-              <a:rPr lang="en-US" sz="3200" b="1" dirty="0" err="1" smtClean="0">
-                <a:latin typeface="Courier New" panose="02070309020205020404" pitchFamily="49" charset="0"/>
-                <a:cs typeface="Courier New" panose="02070309020205020404" pitchFamily="49" charset="0"/>
-              </a:rPr>
-              <a:t>vcsrepo.pp</a:t>
-            </a:r>
-            <a:endParaRPr lang="en-US" sz="3200" b="1" dirty="0" smtClean="0">
-              <a:latin typeface="Courier New" panose="02070309020205020404" pitchFamily="49" charset="0"/>
-              <a:cs typeface="Courier New" panose="02070309020205020404" pitchFamily="49" charset="0"/>
-            </a:endParaRPr>
-          </a:p>
-          <a:p>
-            <a:pPr marL="0" indent="0">
-              <a:buNone/>
-            </a:pPr>
-            <a:r>
-              <a:rPr lang="en-US" sz="3200" b="1" dirty="0" smtClean="0">
-                <a:latin typeface="Courier New" panose="02070309020205020404" pitchFamily="49" charset="0"/>
-                <a:cs typeface="Courier New" panose="02070309020205020404" pitchFamily="49" charset="0"/>
-              </a:rPr>
-              <a:t>	</a:t>
+              </a:rPr>
+              <a:t>#</a:t>
             </a:r>
             <a:r>
               <a:rPr lang="en-US" b="1" dirty="0" smtClean="0">
                 <a:latin typeface="Courier New" panose="02070309020205020404" pitchFamily="49" charset="0"/>
-                <a:cs typeface="Courier New" panose="02070309020205020404" pitchFamily="49" charset="0"/>
-              </a:rPr>
-              <a:t># </a:t>
-            </a:r>
+              </a:rPr>
+              <a:t> puppet module install </a:t>
+            </a:r>
+            <a:r>
+              <a:rPr lang="en-US" b="1" dirty="0" err="1" smtClean="0">
+                <a:latin typeface="Courier New" panose="02070309020205020404" pitchFamily="49" charset="0"/>
+              </a:rPr>
+              <a:t>puppetlabs</a:t>
+            </a:r>
+            <a:r>
+              <a:rPr lang="en-US" b="1" dirty="0" smtClean="0">
+                <a:latin typeface="Courier New" panose="02070309020205020404" pitchFamily="49" charset="0"/>
+              </a:rPr>
+              <a:t>-apache</a:t>
+            </a:r>
+          </a:p>
+          <a:p>
             <a:r>
               <a:rPr lang="en-US" b="1" dirty="0">
                 <a:latin typeface="Courier New" panose="02070309020205020404" pitchFamily="49" charset="0"/>
-                <a:cs typeface="Courier New" panose="02070309020205020404" pitchFamily="49" charset="0"/>
-              </a:rPr>
-              <a:t>instantiate the apache class</a:t>
-            </a:r>
-          </a:p>
-          <a:p>
-            <a:pPr marL="0" indent="0">
-              <a:buNone/>
-            </a:pPr>
+              </a:rPr>
+              <a:t>Notice: Preparing to install into /</a:t>
+            </a:r>
+            <a:r>
+              <a:rPr lang="en-US" b="1" dirty="0" err="1" smtClean="0">
+                <a:latin typeface="Courier New" panose="02070309020205020404" pitchFamily="49" charset="0"/>
+              </a:rPr>
+              <a:t>etc</a:t>
+            </a:r>
             <a:r>
               <a:rPr lang="en-US" b="1" dirty="0" smtClean="0">
                 <a:latin typeface="Courier New" panose="02070309020205020404" pitchFamily="49" charset="0"/>
-                <a:cs typeface="Courier New" panose="02070309020205020404" pitchFamily="49" charset="0"/>
-              </a:rPr>
-              <a:t>	class </a:t>
+              </a:rPr>
+              <a:t>/puppet/modules</a:t>
+            </a:r>
+          </a:p>
+          <a:p>
+            <a:r>
+              <a:rPr lang="en-US" b="1" dirty="0" smtClean="0">
+                <a:latin typeface="Courier New" panose="02070309020205020404" pitchFamily="49" charset="0"/>
+              </a:rPr>
+              <a:t>Notice</a:t>
             </a:r>
             <a:r>
               <a:rPr lang="en-US" b="1" dirty="0">
                 <a:latin typeface="Courier New" panose="02070309020205020404" pitchFamily="49" charset="0"/>
-                <a:cs typeface="Courier New" panose="02070309020205020404" pitchFamily="49" charset="0"/>
-              </a:rPr>
-              <a:t>{ 'apache': </a:t>
+              </a:rPr>
+              <a:t>: Downloading from https://</a:t>
             </a:r>
             <a:r>
               <a:rPr lang="en-US" b="1" dirty="0" smtClean="0">
                 <a:latin typeface="Courier New" panose="02070309020205020404" pitchFamily="49" charset="0"/>
-                <a:cs typeface="Courier New" panose="02070309020205020404" pitchFamily="49" charset="0"/>
-              </a:rPr>
-              <a:t>}</a:t>
-            </a:r>
-          </a:p>
-          <a:p>
-            <a:pPr marL="0" indent="0">
-              <a:buNone/>
-            </a:pPr>
+              </a:rPr>
+              <a:t>forgeapi.puppetlabs.com</a:t>
+            </a:r>
+          </a:p>
+          <a:p>
+            <a:r>
+              <a:rPr lang="en-US" b="1" dirty="0" smtClean="0">
+                <a:latin typeface="Courier New" panose="02070309020205020404" pitchFamily="49" charset="0"/>
+              </a:rPr>
+              <a:t>Notice</a:t>
+            </a:r>
             <a:r>
               <a:rPr lang="en-US" b="1" dirty="0">
                 <a:latin typeface="Courier New" panose="02070309020205020404" pitchFamily="49" charset="0"/>
-                <a:cs typeface="Courier New" panose="02070309020205020404" pitchFamily="49" charset="0"/>
-              </a:rPr>
-              <a:t>	</a:t>
-            </a:r>
-            <a:r>
-              <a:rPr lang="en-US" b="1" dirty="0" smtClean="0">
-                <a:latin typeface="Courier New" panose="02070309020205020404" pitchFamily="49" charset="0"/>
-                <a:cs typeface="Courier New" panose="02070309020205020404" pitchFamily="49" charset="0"/>
-              </a:rPr>
-              <a:t># </a:t>
-            </a:r>
+              </a:rPr>
+              <a:t>: Installing -- do not interrupt ...</a:t>
+            </a:r>
+          </a:p>
+          <a:p>
             <a:r>
               <a:rPr lang="en-US" b="1" dirty="0">
                 <a:latin typeface="Courier New" panose="02070309020205020404" pitchFamily="49" charset="0"/>
-                <a:cs typeface="Courier New" panose="02070309020205020404" pitchFamily="49" charset="0"/>
-              </a:rPr>
-              <a:t>clone the </a:t>
-            </a:r>
-            <a:r>
-              <a:rPr lang="en-US" b="1" dirty="0" smtClean="0">
+              </a:rPr>
+              <a:t>/</a:t>
+            </a:r>
+            <a:r>
+              <a:rPr lang="en-US" b="1" dirty="0" err="1">
                 <a:latin typeface="Courier New" panose="02070309020205020404" pitchFamily="49" charset="0"/>
-                <a:cs typeface="Courier New" panose="02070309020205020404" pitchFamily="49" charset="0"/>
-              </a:rPr>
-              <a:t>repository</a:t>
-            </a:r>
-            <a:endParaRPr lang="en-US" b="1" dirty="0">
-              <a:latin typeface="Courier New" panose="02070309020205020404" pitchFamily="49" charset="0"/>
-              <a:cs typeface="Courier New" panose="02070309020205020404" pitchFamily="49" charset="0"/>
-            </a:endParaRPr>
-          </a:p>
-          <a:p>
-            <a:pPr marL="0" indent="0">
-              <a:buNone/>
-            </a:pPr>
-            <a:r>
-              <a:rPr lang="en-US" b="1" dirty="0" smtClean="0">
-                <a:latin typeface="Courier New" panose="02070309020205020404" pitchFamily="49" charset="0"/>
-                <a:cs typeface="Courier New" panose="02070309020205020404" pitchFamily="49" charset="0"/>
-              </a:rPr>
-              <a:t>	</a:t>
-            </a:r>
-            <a:r>
-              <a:rPr lang="en-US" b="1" dirty="0" err="1" smtClean="0">
-                <a:latin typeface="Courier New" panose="02070309020205020404" pitchFamily="49" charset="0"/>
-                <a:cs typeface="Courier New" panose="02070309020205020404" pitchFamily="49" charset="0"/>
-              </a:rPr>
-              <a:t>vcsrepo</a:t>
-            </a:r>
-            <a:r>
-              <a:rPr lang="en-US" b="1" dirty="0" smtClean="0">
-                <a:latin typeface="Courier New" panose="02070309020205020404" pitchFamily="49" charset="0"/>
-                <a:cs typeface="Courier New" panose="02070309020205020404" pitchFamily="49" charset="0"/>
-              </a:rPr>
-              <a:t> </a:t>
+              </a:rPr>
+              <a:t>etc</a:t>
             </a:r>
             <a:r>
               <a:rPr lang="en-US" b="1" dirty="0">
                 <a:latin typeface="Courier New" panose="02070309020205020404" pitchFamily="49" charset="0"/>
-                <a:cs typeface="Courier New" panose="02070309020205020404" pitchFamily="49" charset="0"/>
-              </a:rPr>
-              <a:t>{ $</a:t>
+              </a:rPr>
+              <a:t>/puppet/modules</a:t>
+            </a:r>
+          </a:p>
+          <a:p>
+            <a:r>
+              <a:rPr lang="en-US" b="1" dirty="0">
+                <a:latin typeface="Courier New" panose="02070309020205020404" pitchFamily="49" charset="0"/>
+              </a:rPr>
+              <a:t>└─┬ </a:t>
             </a:r>
             <a:r>
               <a:rPr lang="en-US" b="1" dirty="0" err="1">
                 <a:latin typeface="Courier New" panose="02070309020205020404" pitchFamily="49" charset="0"/>
-                <a:cs typeface="Courier New" panose="02070309020205020404" pitchFamily="49" charset="0"/>
-              </a:rPr>
-              <a:t>docroot</a:t>
-            </a:r>
-            <a:r>
-              <a:rPr lang="en-US" b="1" dirty="0" smtClean="0">
+              </a:rPr>
+              <a:t>puppetlabs</a:t>
+            </a:r>
+            <a:r>
+              <a:rPr lang="en-US" b="1" dirty="0">
                 <a:latin typeface="Courier New" panose="02070309020205020404" pitchFamily="49" charset="0"/>
-                <a:cs typeface="Courier New" panose="02070309020205020404" pitchFamily="49" charset="0"/>
-              </a:rPr>
-              <a:t>: …}</a:t>
-            </a:r>
-          </a:p>
-          <a:p>
-            <a:pPr marL="0" indent="0">
-              <a:buNone/>
-            </a:pPr>
-            <a:endParaRPr lang="en-US" b="1" dirty="0" smtClean="0">
-              <a:latin typeface="Courier New" panose="02070309020205020404" pitchFamily="49" charset="0"/>
-              <a:cs typeface="Courier New" panose="02070309020205020404" pitchFamily="49" charset="0"/>
-            </a:endParaRPr>
-          </a:p>
-          <a:p>
-            <a:pPr marL="0" indent="0">
-              <a:buNone/>
-            </a:pPr>
-            <a:r>
-              <a:rPr lang="en-US" sz="3200" b="1" dirty="0">
+              </a:rPr>
+              <a:t>-apache (v1.1.0)</a:t>
+            </a:r>
+          </a:p>
+          <a:p>
+            <a:r>
+              <a:rPr lang="en-US" b="1" dirty="0">
                 <a:latin typeface="Courier New" panose="02070309020205020404" pitchFamily="49" charset="0"/>
-                <a:cs typeface="Courier New" panose="02070309020205020404" pitchFamily="49" charset="0"/>
-              </a:rPr>
-              <a:t>$ </a:t>
-            </a:r>
-            <a:r>
-              <a:rPr lang="en-US" sz="3200" b="1" dirty="0" err="1">
+              </a:rPr>
+              <a:t>  ├── </a:t>
+            </a:r>
+            <a:r>
+              <a:rPr lang="en-US" b="1" dirty="0" err="1">
                 <a:latin typeface="Courier New" panose="02070309020205020404" pitchFamily="49" charset="0"/>
-                <a:cs typeface="Courier New" panose="02070309020205020404" pitchFamily="49" charset="0"/>
-              </a:rPr>
-              <a:t>sudo</a:t>
-            </a:r>
-            <a:r>
-              <a:rPr lang="en-US" sz="3200" b="1" dirty="0">
+              </a:rPr>
+              <a:t>puppetlabs-concat</a:t>
+            </a:r>
+            <a:r>
+              <a:rPr lang="en-US" b="1" dirty="0">
                 <a:latin typeface="Courier New" panose="02070309020205020404" pitchFamily="49" charset="0"/>
-                <a:cs typeface="Courier New" panose="02070309020205020404" pitchFamily="49" charset="0"/>
-              </a:rPr>
-              <a:t> puppet apply apache-</a:t>
-            </a:r>
-            <a:r>
-              <a:rPr lang="en-US" sz="3200" b="1" dirty="0" err="1">
+              </a:rPr>
+              <a:t> (v1.1.0)</a:t>
+            </a:r>
+          </a:p>
+          <a:p>
+            <a:r>
+              <a:rPr lang="en-US" b="1" dirty="0">
                 <a:latin typeface="Courier New" panose="02070309020205020404" pitchFamily="49" charset="0"/>
-                <a:cs typeface="Courier New" panose="02070309020205020404" pitchFamily="49" charset="0"/>
-              </a:rPr>
-              <a:t>vcsrepo.pp</a:t>
-            </a:r>
-            <a:endParaRPr lang="en-US" sz="3200" b="1" dirty="0">
-              <a:latin typeface="Courier New" panose="02070309020205020404" pitchFamily="49" charset="0"/>
-              <a:cs typeface="Courier New" panose="02070309020205020404" pitchFamily="49" charset="0"/>
-            </a:endParaRPr>
-          </a:p>
-          <a:p>
-            <a:pPr marL="0" indent="0">
-              <a:buNone/>
-            </a:pPr>
-            <a:endParaRPr lang="en-US" b="1" baseline="0" dirty="0" smtClean="0">
-              <a:latin typeface="Courier New" panose="02070309020205020404" pitchFamily="49" charset="0"/>
-              <a:cs typeface="Courier New" panose="02070309020205020404" pitchFamily="49" charset="0"/>
-            </a:endParaRPr>
+              </a:rPr>
+              <a:t>  └── </a:t>
+            </a:r>
+            <a:r>
+              <a:rPr lang="en-US" b="1" dirty="0" err="1">
+                <a:latin typeface="Courier New" panose="02070309020205020404" pitchFamily="49" charset="0"/>
+              </a:rPr>
+              <a:t>puppetlabs-stdlib</a:t>
+            </a:r>
+            <a:r>
+              <a:rPr lang="en-US" b="1" dirty="0">
+                <a:latin typeface="Courier New" panose="02070309020205020404" pitchFamily="49" charset="0"/>
+              </a:rPr>
+              <a:t> (v4.2.2)</a:t>
+            </a:r>
+          </a:p>
+          <a:p>
+            <a:endParaRPr lang="en-US" b="1" baseline="0" dirty="0" smtClean="0"/>
           </a:p>
         </p:txBody>
       </p:sp>
     </p:spTree>
     <p:extLst>
       <p:ext uri="{BB962C8B-B14F-4D97-AF65-F5344CB8AC3E}">
-        <p14:creationId xmlns:p14="http://schemas.microsoft.com/office/powerpoint/2010/main" val="854398052"/>
+        <p14:creationId xmlns:p14="http://schemas.microsoft.com/office/powerpoint/2010/main" val="1905540571"/>
       </p:ext>
     </p:extLst>
   </p:cSld>
@@ -5495,7 +5250,7 @@
           <a:p>
             <a:r>
               <a:rPr lang="en-US" dirty="0" smtClean="0"/>
-              <a:t>Apply Modules</a:t>
+              <a:t>Install Modules</a:t>
             </a:r>
             <a:endParaRPr lang="en-US" dirty="0"/>
           </a:p>
@@ -5514,151 +5269,161 @@
         <p:spPr>
           <a:xfrm>
             <a:off x="676656" y="2011680"/>
-            <a:ext cx="10753725" cy="4641368"/>
+            <a:ext cx="10753725" cy="4215699"/>
           </a:xfrm>
         </p:spPr>
         <p:txBody>
           <a:bodyPr>
-            <a:normAutofit/>
+            <a:noAutofit/>
           </a:bodyPr>
           <a:lstStyle/>
           <a:p>
-            <a:pPr marL="0" indent="0">
-              <a:buNone/>
-            </a:pPr>
-            <a:r>
-              <a:rPr lang="en-US" sz="3200" b="1" dirty="0" smtClean="0"/>
-              <a:t>Confirm that the modules were applied properly with “puppet resource” command (or built-in commands)</a:t>
-            </a:r>
-          </a:p>
-          <a:p>
-            <a:pPr marL="0" indent="0">
-              <a:buNone/>
-            </a:pPr>
-            <a:r>
-              <a:rPr lang="en-US" sz="3200" b="1" dirty="0" smtClean="0"/>
-              <a:t>Package</a:t>
-            </a:r>
-            <a:r>
-              <a:rPr lang="en-US" sz="3200" b="1" dirty="0"/>
-              <a:t>: </a:t>
-            </a:r>
-            <a:endParaRPr lang="en-US" sz="3200" b="1" dirty="0" smtClean="0"/>
-          </a:p>
-          <a:p>
-            <a:pPr marL="0" indent="0">
-              <a:buNone/>
-            </a:pPr>
-            <a:r>
-              <a:rPr lang="en-US" sz="3200" b="1" dirty="0">
-                <a:latin typeface="Courier New" panose="02070309020205020404" pitchFamily="49" charset="0"/>
+            <a:r>
+              <a:rPr lang="en-US" sz="3200" b="1" dirty="0" smtClean="0">
                 <a:cs typeface="Courier New" panose="02070309020205020404" pitchFamily="49" charset="0"/>
               </a:rPr>
-              <a:t>	</a:t>
-            </a:r>
-            <a:r>
-              <a:rPr lang="en-US" sz="3200" b="1" dirty="0" smtClean="0">
-                <a:latin typeface="Courier New" panose="02070309020205020404" pitchFamily="49" charset="0"/>
-                <a:cs typeface="Courier New" panose="02070309020205020404" pitchFamily="49" charset="0"/>
-              </a:rPr>
-              <a:t>puppet </a:t>
-            </a:r>
-            <a:r>
-              <a:rPr lang="en-US" sz="3200" b="1" dirty="0">
-                <a:latin typeface="Courier New" panose="02070309020205020404" pitchFamily="49" charset="0"/>
-                <a:cs typeface="Courier New" panose="02070309020205020404" pitchFamily="49" charset="0"/>
-              </a:rPr>
-              <a:t>resource package </a:t>
-            </a:r>
-            <a:r>
-              <a:rPr lang="en-US" sz="3200" b="1" dirty="0" err="1">
-                <a:latin typeface="Courier New" panose="02070309020205020404" pitchFamily="49" charset="0"/>
-                <a:cs typeface="Courier New" panose="02070309020205020404" pitchFamily="49" charset="0"/>
-              </a:rPr>
-              <a:t>git</a:t>
-            </a:r>
-            <a:endParaRPr lang="en-US" sz="3200" b="1" dirty="0">
+              <a:t>Display the modules that are installed with “module list”</a:t>
+            </a:r>
+          </a:p>
+          <a:p>
+            <a:endParaRPr lang="en-US" b="1" dirty="0">
               <a:latin typeface="Courier New" panose="02070309020205020404" pitchFamily="49" charset="0"/>
               <a:cs typeface="Courier New" panose="02070309020205020404" pitchFamily="49" charset="0"/>
             </a:endParaRPr>
           </a:p>
           <a:p>
-            <a:pPr marL="0" indent="0">
-              <a:buNone/>
-            </a:pPr>
-            <a:r>
-              <a:rPr lang="en-US" sz="3200" b="1" dirty="0"/>
-              <a:t>File: </a:t>
-            </a:r>
-          </a:p>
-          <a:p>
-            <a:pPr marL="0" indent="0">
-              <a:buNone/>
-            </a:pPr>
-            <a:r>
-              <a:rPr lang="en-US" sz="3200" b="1" dirty="0">
+            <a:r>
+              <a:rPr lang="en-US" b="1" dirty="0" smtClean="0">
                 <a:latin typeface="Courier New" panose="02070309020205020404" pitchFamily="49" charset="0"/>
                 <a:cs typeface="Courier New" panose="02070309020205020404" pitchFamily="49" charset="0"/>
               </a:rPr>
-              <a:t>	puppet resource file /www</a:t>
-            </a:r>
-          </a:p>
-          <a:p>
-            <a:pPr marL="0" indent="0">
-              <a:buNone/>
-            </a:pPr>
-            <a:r>
-              <a:rPr lang="en-US" sz="3200" b="1" dirty="0" smtClean="0"/>
-              <a:t>Service</a:t>
-            </a:r>
-            <a:r>
-              <a:rPr lang="en-US" sz="3200" b="1" dirty="0" smtClean="0"/>
-              <a:t>: </a:t>
-            </a:r>
-          </a:p>
-          <a:p>
-            <a:pPr marL="0" indent="0">
-              <a:buNone/>
-            </a:pPr>
-            <a:r>
-              <a:rPr lang="en-US" sz="3200" b="1" dirty="0">
+              <a:t># puppet module list</a:t>
+            </a:r>
+          </a:p>
+          <a:p>
+            <a:r>
+              <a:rPr lang="en-US" b="1" dirty="0">
                 <a:latin typeface="Courier New" panose="02070309020205020404" pitchFamily="49" charset="0"/>
                 <a:cs typeface="Courier New" panose="02070309020205020404" pitchFamily="49" charset="0"/>
               </a:rPr>
-              <a:t>	</a:t>
-            </a:r>
-            <a:r>
-              <a:rPr lang="en-US" sz="3200" b="1" dirty="0" smtClean="0">
+              <a:t>/</a:t>
+            </a:r>
+            <a:r>
+              <a:rPr lang="en-US" b="1" dirty="0" err="1">
                 <a:latin typeface="Courier New" panose="02070309020205020404" pitchFamily="49" charset="0"/>
                 <a:cs typeface="Courier New" panose="02070309020205020404" pitchFamily="49" charset="0"/>
               </a:rPr>
-              <a:t>puppet </a:t>
-            </a:r>
-            <a:r>
-              <a:rPr lang="en-US" sz="3200" b="1" dirty="0">
+              <a:t>etc</a:t>
+            </a:r>
+            <a:r>
+              <a:rPr lang="en-US" b="1" dirty="0">
                 <a:latin typeface="Courier New" panose="02070309020205020404" pitchFamily="49" charset="0"/>
                 <a:cs typeface="Courier New" panose="02070309020205020404" pitchFamily="49" charset="0"/>
               </a:rPr>
-              <a:t>resource service </a:t>
-            </a:r>
-            <a:r>
-              <a:rPr lang="en-US" sz="3200" b="1" dirty="0" smtClean="0">
+              <a:t>/puppet/modules</a:t>
+            </a:r>
+          </a:p>
+          <a:p>
+            <a:r>
+              <a:rPr lang="en-US" b="1" dirty="0">
                 <a:latin typeface="Courier New" panose="02070309020205020404" pitchFamily="49" charset="0"/>
                 <a:cs typeface="Courier New" panose="02070309020205020404" pitchFamily="49" charset="0"/>
               </a:rPr>
-              <a:t>apache2</a:t>
-            </a:r>
-            <a:endParaRPr lang="en-US" sz="3200" b="1" dirty="0" smtClean="0">
-              <a:latin typeface="Courier New" panose="02070309020205020404" pitchFamily="49" charset="0"/>
-              <a:cs typeface="Courier New" panose="02070309020205020404" pitchFamily="49" charset="0"/>
-            </a:endParaRPr>
+              <a:t>├── </a:t>
+            </a:r>
+            <a:r>
+              <a:rPr lang="en-US" b="1" dirty="0" err="1">
+                <a:latin typeface="Courier New" panose="02070309020205020404" pitchFamily="49" charset="0"/>
+                <a:cs typeface="Courier New" panose="02070309020205020404" pitchFamily="49" charset="0"/>
+              </a:rPr>
+              <a:t>puppetlabs</a:t>
+            </a:r>
+            <a:r>
+              <a:rPr lang="en-US" b="1" dirty="0">
+                <a:latin typeface="Courier New" panose="02070309020205020404" pitchFamily="49" charset="0"/>
+                <a:cs typeface="Courier New" panose="02070309020205020404" pitchFamily="49" charset="0"/>
+              </a:rPr>
+              <a:t>-apache (v1.1.0)</a:t>
+            </a:r>
+          </a:p>
+          <a:p>
+            <a:r>
+              <a:rPr lang="en-US" b="1" dirty="0">
+                <a:latin typeface="Courier New" panose="02070309020205020404" pitchFamily="49" charset="0"/>
+                <a:cs typeface="Courier New" panose="02070309020205020404" pitchFamily="49" charset="0"/>
+              </a:rPr>
+              <a:t>├── </a:t>
+            </a:r>
+            <a:r>
+              <a:rPr lang="en-US" b="1" dirty="0" err="1">
+                <a:latin typeface="Courier New" panose="02070309020205020404" pitchFamily="49" charset="0"/>
+                <a:cs typeface="Courier New" panose="02070309020205020404" pitchFamily="49" charset="0"/>
+              </a:rPr>
+              <a:t>puppetlabs-concat</a:t>
+            </a:r>
+            <a:r>
+              <a:rPr lang="en-US" b="1" dirty="0">
+                <a:latin typeface="Courier New" panose="02070309020205020404" pitchFamily="49" charset="0"/>
+                <a:cs typeface="Courier New" panose="02070309020205020404" pitchFamily="49" charset="0"/>
+              </a:rPr>
+              <a:t> (v1.1.0)</a:t>
+            </a:r>
+          </a:p>
+          <a:p>
+            <a:r>
+              <a:rPr lang="en-US" b="1" dirty="0">
+                <a:latin typeface="Courier New" panose="02070309020205020404" pitchFamily="49" charset="0"/>
+                <a:cs typeface="Courier New" panose="02070309020205020404" pitchFamily="49" charset="0"/>
+              </a:rPr>
+              <a:t>├── </a:t>
+            </a:r>
+            <a:r>
+              <a:rPr lang="en-US" b="1" dirty="0" err="1">
+                <a:latin typeface="Courier New" panose="02070309020205020404" pitchFamily="49" charset="0"/>
+                <a:cs typeface="Courier New" panose="02070309020205020404" pitchFamily="49" charset="0"/>
+              </a:rPr>
+              <a:t>puppetlabs-stdlib</a:t>
+            </a:r>
+            <a:r>
+              <a:rPr lang="en-US" b="1" dirty="0">
+                <a:latin typeface="Courier New" panose="02070309020205020404" pitchFamily="49" charset="0"/>
+                <a:cs typeface="Courier New" panose="02070309020205020404" pitchFamily="49" charset="0"/>
+              </a:rPr>
+              <a:t> (v4.2.2)</a:t>
+            </a:r>
+          </a:p>
+          <a:p>
+            <a:r>
+              <a:rPr lang="en-US" b="1" dirty="0">
+                <a:latin typeface="Courier New" panose="02070309020205020404" pitchFamily="49" charset="0"/>
+                <a:cs typeface="Courier New" panose="02070309020205020404" pitchFamily="49" charset="0"/>
+              </a:rPr>
+              <a:t>└── </a:t>
+            </a:r>
+            <a:r>
+              <a:rPr lang="en-US" b="1" dirty="0" err="1">
+                <a:latin typeface="Courier New" panose="02070309020205020404" pitchFamily="49" charset="0"/>
+                <a:cs typeface="Courier New" panose="02070309020205020404" pitchFamily="49" charset="0"/>
+              </a:rPr>
+              <a:t>puppetlabs-vcsrepo</a:t>
+            </a:r>
+            <a:r>
+              <a:rPr lang="en-US" b="1" dirty="0">
+                <a:latin typeface="Courier New" panose="02070309020205020404" pitchFamily="49" charset="0"/>
+                <a:cs typeface="Courier New" panose="02070309020205020404" pitchFamily="49" charset="0"/>
+              </a:rPr>
+              <a:t> (v1.0.2)</a:t>
+            </a:r>
+          </a:p>
+          <a:p>
+            <a:endParaRPr lang="en-US" b="1" dirty="0"/>
           </a:p>
         </p:txBody>
       </p:sp>
     </p:spTree>
     <p:extLst>
       <p:ext uri="{BB962C8B-B14F-4D97-AF65-F5344CB8AC3E}">
-        <p14:creationId xmlns:p14="http://schemas.microsoft.com/office/powerpoint/2010/main" val="3576526012"/>
+        <p14:creationId xmlns:p14="http://schemas.microsoft.com/office/powerpoint/2010/main" val="2973901822"/>
       </p:ext>
     </p:extLst>
   </p:cSld>
@@ -5709,7 +5474,7 @@
           <a:p>
             <a:r>
               <a:rPr lang="en-US" dirty="0" smtClean="0"/>
-              <a:t>DEMO</a:t>
+              <a:t>Apply Modules</a:t>
             </a:r>
             <a:endParaRPr lang="en-US" dirty="0"/>
           </a:p>
@@ -5728,89 +5493,243 @@
         <p:spPr>
           <a:xfrm>
             <a:off x="676656" y="2011680"/>
-            <a:ext cx="10753725" cy="4531010"/>
+            <a:ext cx="10753725" cy="4373354"/>
           </a:xfrm>
         </p:spPr>
         <p:txBody>
           <a:bodyPr>
-            <a:normAutofit/>
+            <a:noAutofit/>
           </a:bodyPr>
           <a:lstStyle/>
           <a:p>
-            <a:pPr marL="457200" indent="-457200">
-              <a:buFont typeface="+mj-lt"/>
-              <a:buAutoNum type="arabicPeriod"/>
+            <a:pPr marL="0" indent="0">
+              <a:buNone/>
             </a:pPr>
             <a:r>
               <a:rPr lang="en-US" sz="3200" b="1" dirty="0" smtClean="0"/>
-              <a:t>Install the latest version of Puppet </a:t>
-            </a:r>
-            <a:r>
-              <a:rPr lang="en-US" sz="3200" b="1" dirty="0" smtClean="0"/>
-              <a:t>Enterprise.  Search the Puppet Forge to find the modules we need to reach our goal.</a:t>
-            </a:r>
-            <a:r>
-              <a:rPr lang="en-US" sz="3200" b="1" dirty="0" smtClean="0"/>
-              <a:t/>
-            </a:r>
-            <a:br>
-              <a:rPr lang="en-US" sz="3200" b="1" dirty="0" smtClean="0"/>
-            </a:br>
-            <a:endParaRPr lang="en-US" sz="3200" b="1" dirty="0" smtClean="0"/>
-          </a:p>
-          <a:p>
-            <a:pPr marL="457200" indent="-457200">
-              <a:buFont typeface="+mj-lt"/>
-              <a:buAutoNum type="arabicPeriod"/>
+              <a:t>Call out installed modules in a puppet manifest</a:t>
+            </a:r>
+          </a:p>
+          <a:p>
+            <a:pPr marL="0" indent="0">
+              <a:buNone/>
             </a:pPr>
             <a:r>
-              <a:rPr lang="en-US" sz="3200" b="1" dirty="0" smtClean="0"/>
-              <a:t>Check the environment before we install and apply modules</a:t>
-            </a:r>
-            <a:br>
-              <a:rPr lang="en-US" sz="3200" b="1" dirty="0" smtClean="0"/>
-            </a:br>
-            <a:endParaRPr lang="en-US" sz="3200" b="1" dirty="0" smtClean="0"/>
-          </a:p>
-          <a:p>
-            <a:pPr marL="457200" indent="-457200">
-              <a:buFont typeface="+mj-lt"/>
-              <a:buAutoNum type="arabicPeriod"/>
+              <a:rPr lang="en-US" sz="3200" b="1" dirty="0" smtClean="0">
+                <a:latin typeface="Courier New" panose="02070309020205020404" pitchFamily="49" charset="0"/>
+                <a:cs typeface="Courier New" panose="02070309020205020404" pitchFamily="49" charset="0"/>
+              </a:rPr>
+              <a:t>$ vi apache-</a:t>
+            </a:r>
+            <a:r>
+              <a:rPr lang="en-US" sz="3200" b="1" dirty="0" err="1" smtClean="0">
+                <a:latin typeface="Courier New" panose="02070309020205020404" pitchFamily="49" charset="0"/>
+                <a:cs typeface="Courier New" panose="02070309020205020404" pitchFamily="49" charset="0"/>
+              </a:rPr>
+              <a:t>vcsrepo.pp</a:t>
+            </a:r>
+            <a:endParaRPr lang="en-US" sz="3200" b="1" dirty="0" smtClean="0">
+              <a:latin typeface="Courier New" panose="02070309020205020404" pitchFamily="49" charset="0"/>
+              <a:cs typeface="Courier New" panose="02070309020205020404" pitchFamily="49" charset="0"/>
+            </a:endParaRPr>
+          </a:p>
+          <a:p>
+            <a:pPr marL="0" indent="0">
+              <a:buNone/>
             </a:pPr>
             <a:r>
-              <a:rPr lang="en-US" sz="3200" b="1" dirty="0" smtClean="0"/>
-              <a:t>Install apache and </a:t>
-            </a:r>
-            <a:r>
-              <a:rPr lang="en-US" sz="3200" b="1" dirty="0" err="1" smtClean="0"/>
+              <a:rPr lang="en-US" sz="3200" b="1" dirty="0" smtClean="0">
+                <a:latin typeface="Courier New" panose="02070309020205020404" pitchFamily="49" charset="0"/>
+                <a:cs typeface="Courier New" panose="02070309020205020404" pitchFamily="49" charset="0"/>
+              </a:rPr>
+              <a:t>	</a:t>
+            </a:r>
+            <a:r>
+              <a:rPr lang="en-US" b="1" dirty="0" smtClean="0">
+                <a:latin typeface="Courier New" panose="02070309020205020404" pitchFamily="49" charset="0"/>
+                <a:cs typeface="Courier New" panose="02070309020205020404" pitchFamily="49" charset="0"/>
+              </a:rPr>
+              <a:t># </a:t>
+            </a:r>
+            <a:r>
+              <a:rPr lang="en-US" b="1" dirty="0">
+                <a:latin typeface="Courier New" panose="02070309020205020404" pitchFamily="49" charset="0"/>
+                <a:cs typeface="Courier New" panose="02070309020205020404" pitchFamily="49" charset="0"/>
+              </a:rPr>
+              <a:t>instantiate the apache class</a:t>
+            </a:r>
+          </a:p>
+          <a:p>
+            <a:pPr marL="0" indent="0">
+              <a:buNone/>
+            </a:pPr>
+            <a:r>
+              <a:rPr lang="en-US" b="1" dirty="0" smtClean="0">
+                <a:latin typeface="Courier New" panose="02070309020205020404" pitchFamily="49" charset="0"/>
+                <a:cs typeface="Courier New" panose="02070309020205020404" pitchFamily="49" charset="0"/>
+              </a:rPr>
+              <a:t>	class </a:t>
+            </a:r>
+            <a:r>
+              <a:rPr lang="en-US" b="1" dirty="0">
+                <a:latin typeface="Courier New" panose="02070309020205020404" pitchFamily="49" charset="0"/>
+                <a:cs typeface="Courier New" panose="02070309020205020404" pitchFamily="49" charset="0"/>
+              </a:rPr>
+              <a:t>{ 'apache': </a:t>
+            </a:r>
+            <a:r>
+              <a:rPr lang="en-US" b="1" dirty="0" smtClean="0">
+                <a:latin typeface="Courier New" panose="02070309020205020404" pitchFamily="49" charset="0"/>
+                <a:cs typeface="Courier New" panose="02070309020205020404" pitchFamily="49" charset="0"/>
+              </a:rPr>
+              <a:t>}</a:t>
+            </a:r>
+          </a:p>
+          <a:p>
+            <a:pPr marL="0" indent="0">
+              <a:buNone/>
+            </a:pPr>
+            <a:r>
+              <a:rPr lang="en-US" b="1" dirty="0">
+                <a:latin typeface="Courier New" panose="02070309020205020404" pitchFamily="49" charset="0"/>
+                <a:cs typeface="Courier New" panose="02070309020205020404" pitchFamily="49" charset="0"/>
+              </a:rPr>
+              <a:t>	</a:t>
+            </a:r>
+            <a:r>
+              <a:rPr lang="en-US" b="1" dirty="0" smtClean="0">
+                <a:latin typeface="Courier New" panose="02070309020205020404" pitchFamily="49" charset="0"/>
+                <a:cs typeface="Courier New" panose="02070309020205020404" pitchFamily="49" charset="0"/>
+              </a:rPr>
+              <a:t># </a:t>
+            </a:r>
+            <a:r>
+              <a:rPr lang="en-US" b="1" dirty="0">
+                <a:latin typeface="Courier New" panose="02070309020205020404" pitchFamily="49" charset="0"/>
+                <a:cs typeface="Courier New" panose="02070309020205020404" pitchFamily="49" charset="0"/>
+              </a:rPr>
+              <a:t>clone the </a:t>
+            </a:r>
+            <a:r>
+              <a:rPr lang="en-US" b="1" dirty="0" smtClean="0">
+                <a:latin typeface="Courier New" panose="02070309020205020404" pitchFamily="49" charset="0"/>
+                <a:cs typeface="Courier New" panose="02070309020205020404" pitchFamily="49" charset="0"/>
+              </a:rPr>
+              <a:t>repository</a:t>
+            </a:r>
+            <a:endParaRPr lang="en-US" b="1" dirty="0">
+              <a:latin typeface="Courier New" panose="02070309020205020404" pitchFamily="49" charset="0"/>
+              <a:cs typeface="Courier New" panose="02070309020205020404" pitchFamily="49" charset="0"/>
+            </a:endParaRPr>
+          </a:p>
+          <a:p>
+            <a:pPr marL="0" indent="0">
+              <a:buNone/>
+            </a:pPr>
+            <a:r>
+              <a:rPr lang="en-US" b="1" dirty="0" smtClean="0">
+                <a:latin typeface="Courier New" panose="02070309020205020404" pitchFamily="49" charset="0"/>
+                <a:cs typeface="Courier New" panose="02070309020205020404" pitchFamily="49" charset="0"/>
+              </a:rPr>
+              <a:t>	</a:t>
+            </a:r>
+            <a:r>
+              <a:rPr lang="en-US" b="1" dirty="0" err="1" smtClean="0">
+                <a:latin typeface="Courier New" panose="02070309020205020404" pitchFamily="49" charset="0"/>
+                <a:cs typeface="Courier New" panose="02070309020205020404" pitchFamily="49" charset="0"/>
+              </a:rPr>
               <a:t>vcsrepo</a:t>
             </a:r>
             <a:r>
-              <a:rPr lang="en-US" sz="3200" b="1" dirty="0" smtClean="0"/>
-              <a:t> modules; Draft and apply a manifest</a:t>
-            </a:r>
-            <a:br>
-              <a:rPr lang="en-US" sz="3200" b="1" dirty="0" smtClean="0"/>
-            </a:br>
-            <a:endParaRPr lang="en-US" sz="3200" b="1" dirty="0" smtClean="0"/>
-          </a:p>
-          <a:p>
-            <a:pPr marL="457200" indent="-457200">
-              <a:buFont typeface="+mj-lt"/>
-              <a:buAutoNum type="arabicPeriod"/>
+              <a:rPr lang="en-US" b="1" dirty="0" smtClean="0">
+                <a:latin typeface="Courier New" panose="02070309020205020404" pitchFamily="49" charset="0"/>
+                <a:cs typeface="Courier New" panose="02070309020205020404" pitchFamily="49" charset="0"/>
+              </a:rPr>
+              <a:t> </a:t>
+            </a:r>
+            <a:r>
+              <a:rPr lang="en-US" b="1" dirty="0">
+                <a:latin typeface="Courier New" panose="02070309020205020404" pitchFamily="49" charset="0"/>
+                <a:cs typeface="Courier New" panose="02070309020205020404" pitchFamily="49" charset="0"/>
+              </a:rPr>
+              <a:t>{ $</a:t>
+            </a:r>
+            <a:r>
+              <a:rPr lang="en-US" b="1" dirty="0" err="1">
+                <a:latin typeface="Courier New" panose="02070309020205020404" pitchFamily="49" charset="0"/>
+                <a:cs typeface="Courier New" panose="02070309020205020404" pitchFamily="49" charset="0"/>
+              </a:rPr>
+              <a:t>docroot</a:t>
+            </a:r>
+            <a:r>
+              <a:rPr lang="en-US" b="1" dirty="0" smtClean="0">
+                <a:latin typeface="Courier New" panose="02070309020205020404" pitchFamily="49" charset="0"/>
+                <a:cs typeface="Courier New" panose="02070309020205020404" pitchFamily="49" charset="0"/>
+              </a:rPr>
+              <a:t>: …}</a:t>
+            </a:r>
+          </a:p>
+          <a:p>
+            <a:pPr marL="0" indent="0">
+              <a:buNone/>
             </a:pPr>
-            <a:r>
-              <a:rPr lang="en-US" sz="3200" b="1" dirty="0" smtClean="0"/>
-              <a:t>Check the environment to confirm and validate the installations</a:t>
-            </a:r>
-            <a:endParaRPr lang="en-US" sz="3200" b="1" dirty="0"/>
+            <a:endParaRPr lang="en-US" b="1" dirty="0" smtClean="0">
+              <a:latin typeface="Courier New" panose="02070309020205020404" pitchFamily="49" charset="0"/>
+              <a:cs typeface="Courier New" panose="02070309020205020404" pitchFamily="49" charset="0"/>
+            </a:endParaRPr>
+          </a:p>
+          <a:p>
+            <a:pPr marL="0" indent="0">
+              <a:buNone/>
+            </a:pPr>
+            <a:r>
+              <a:rPr lang="en-US" sz="3200" b="1" dirty="0">
+                <a:latin typeface="Courier New" panose="02070309020205020404" pitchFamily="49" charset="0"/>
+                <a:cs typeface="Courier New" panose="02070309020205020404" pitchFamily="49" charset="0"/>
+              </a:rPr>
+              <a:t>$ </a:t>
+            </a:r>
+            <a:r>
+              <a:rPr lang="en-US" sz="3200" b="1" dirty="0" err="1">
+                <a:latin typeface="Courier New" panose="02070309020205020404" pitchFamily="49" charset="0"/>
+                <a:cs typeface="Courier New" panose="02070309020205020404" pitchFamily="49" charset="0"/>
+              </a:rPr>
+              <a:t>sudo</a:t>
+            </a:r>
+            <a:r>
+              <a:rPr lang="en-US" sz="3200" b="1" dirty="0">
+                <a:latin typeface="Courier New" panose="02070309020205020404" pitchFamily="49" charset="0"/>
+                <a:cs typeface="Courier New" panose="02070309020205020404" pitchFamily="49" charset="0"/>
+              </a:rPr>
+              <a:t> puppet apply apache-</a:t>
+            </a:r>
+            <a:r>
+              <a:rPr lang="en-US" sz="3200" b="1" dirty="0" err="1">
+                <a:latin typeface="Courier New" panose="02070309020205020404" pitchFamily="49" charset="0"/>
+                <a:cs typeface="Courier New" panose="02070309020205020404" pitchFamily="49" charset="0"/>
+              </a:rPr>
+              <a:t>vcsrepo.pp</a:t>
+            </a:r>
+            <a:endParaRPr lang="en-US" sz="3200" b="1" dirty="0">
+              <a:latin typeface="Courier New" panose="02070309020205020404" pitchFamily="49" charset="0"/>
+              <a:cs typeface="Courier New" panose="02070309020205020404" pitchFamily="49" charset="0"/>
+            </a:endParaRPr>
+          </a:p>
+          <a:p>
+            <a:pPr marL="0" indent="0">
+              <a:buNone/>
+            </a:pPr>
+            <a:endParaRPr lang="en-US" b="1" baseline="0" dirty="0" smtClean="0">
+              <a:latin typeface="Courier New" panose="02070309020205020404" pitchFamily="49" charset="0"/>
+              <a:cs typeface="Courier New" panose="02070309020205020404" pitchFamily="49" charset="0"/>
+            </a:endParaRPr>
           </a:p>
         </p:txBody>
       </p:sp>
     </p:spTree>
     <p:extLst>
       <p:ext uri="{BB962C8B-B14F-4D97-AF65-F5344CB8AC3E}">
-        <p14:creationId xmlns:p14="http://schemas.microsoft.com/office/powerpoint/2010/main" val="410252703"/>
+        <p14:creationId xmlns:p14="http://schemas.microsoft.com/office/powerpoint/2010/main" val="854398052"/>
       </p:ext>
     </p:extLst>
   </p:cSld>
@@ -5846,12 +5765,12 @@
       </p:grpSpPr>
       <p:sp>
         <p:nvSpPr>
-          <p:cNvPr id="4" name="Title 3"/>
-          <p:cNvSpPr>
-            <a:spLocks noGrp="1"/>
-          </p:cNvSpPr>
-          <p:nvPr>
-            <p:ph type="ctrTitle"/>
+          <p:cNvPr id="2" name="Title 1"/>
+          <p:cNvSpPr>
+            <a:spLocks noGrp="1"/>
+          </p:cNvSpPr>
+          <p:nvPr>
+            <p:ph type="title"/>
           </p:nvPr>
         </p:nvSpPr>
         <p:spPr/>
@@ -5860,36 +5779,163 @@
           <a:lstStyle/>
           <a:p>
             <a:r>
-              <a:rPr lang="en-US" b="1" dirty="0" smtClean="0"/>
-              <a:t>BACKUP INFO</a:t>
-            </a:r>
-            <a:endParaRPr lang="en-US" b="1" dirty="0"/>
-          </a:p>
-        </p:txBody>
-      </p:sp>
-      <p:sp>
-        <p:nvSpPr>
-          <p:cNvPr id="5" name="Subtitle 4"/>
-          <p:cNvSpPr>
-            <a:spLocks noGrp="1"/>
-          </p:cNvSpPr>
-          <p:nvPr>
-            <p:ph type="subTitle" idx="1"/>
-          </p:nvPr>
-        </p:nvSpPr>
-        <p:spPr/>
-        <p:txBody>
-          <a:bodyPr/>
-          <a:lstStyle/>
-          <a:p>
-            <a:endParaRPr lang="en-US"/>
+              <a:rPr lang="en-US" dirty="0" smtClean="0"/>
+              <a:t>Apply Modules</a:t>
+            </a:r>
+            <a:endParaRPr lang="en-US" dirty="0"/>
+          </a:p>
+        </p:txBody>
+      </p:sp>
+      <p:sp>
+        <p:nvSpPr>
+          <p:cNvPr id="3" name="Content Placeholder 2"/>
+          <p:cNvSpPr>
+            <a:spLocks noGrp="1"/>
+          </p:cNvSpPr>
+          <p:nvPr>
+            <p:ph idx="1"/>
+          </p:nvPr>
+        </p:nvSpPr>
+        <p:spPr>
+          <a:xfrm>
+            <a:off x="676656" y="2011680"/>
+            <a:ext cx="10753725" cy="4641368"/>
+          </a:xfrm>
+        </p:spPr>
+        <p:txBody>
+          <a:bodyPr>
+            <a:normAutofit/>
+          </a:bodyPr>
+          <a:lstStyle/>
+          <a:p>
+            <a:pPr marL="0" indent="0">
+              <a:buNone/>
+            </a:pPr>
+            <a:r>
+              <a:rPr lang="en-US" sz="3200" b="1" dirty="0" smtClean="0"/>
+              <a:t>Confirm that the modules were applied properly with “puppet resource” command (or built-in commands)</a:t>
+            </a:r>
+          </a:p>
+          <a:p>
+            <a:pPr marL="0" indent="0">
+              <a:buNone/>
+            </a:pPr>
+            <a:r>
+              <a:rPr lang="en-US" sz="3200" b="1" dirty="0" smtClean="0"/>
+              <a:t>Package</a:t>
+            </a:r>
+            <a:r>
+              <a:rPr lang="en-US" sz="3200" b="1" dirty="0"/>
+              <a:t>: </a:t>
+            </a:r>
+            <a:endParaRPr lang="en-US" sz="3200" b="1" dirty="0" smtClean="0"/>
+          </a:p>
+          <a:p>
+            <a:pPr marL="0" indent="0">
+              <a:buNone/>
+            </a:pPr>
+            <a:r>
+              <a:rPr lang="en-US" sz="3200" b="1" dirty="0">
+                <a:latin typeface="Courier New" panose="02070309020205020404" pitchFamily="49" charset="0"/>
+                <a:cs typeface="Courier New" panose="02070309020205020404" pitchFamily="49" charset="0"/>
+              </a:rPr>
+              <a:t>	</a:t>
+            </a:r>
+            <a:r>
+              <a:rPr lang="en-US" sz="3200" b="1" dirty="0" smtClean="0">
+                <a:latin typeface="Courier New" panose="02070309020205020404" pitchFamily="49" charset="0"/>
+                <a:cs typeface="Courier New" panose="02070309020205020404" pitchFamily="49" charset="0"/>
+              </a:rPr>
+              <a:t>puppet </a:t>
+            </a:r>
+            <a:r>
+              <a:rPr lang="en-US" sz="3200" b="1" dirty="0">
+                <a:latin typeface="Courier New" panose="02070309020205020404" pitchFamily="49" charset="0"/>
+                <a:cs typeface="Courier New" panose="02070309020205020404" pitchFamily="49" charset="0"/>
+              </a:rPr>
+              <a:t>resource package </a:t>
+            </a:r>
+            <a:r>
+              <a:rPr lang="en-US" sz="3200" b="1" dirty="0" err="1">
+                <a:latin typeface="Courier New" panose="02070309020205020404" pitchFamily="49" charset="0"/>
+                <a:cs typeface="Courier New" panose="02070309020205020404" pitchFamily="49" charset="0"/>
+              </a:rPr>
+              <a:t>git</a:t>
+            </a:r>
+            <a:endParaRPr lang="en-US" sz="3200" b="1" dirty="0">
+              <a:latin typeface="Courier New" panose="02070309020205020404" pitchFamily="49" charset="0"/>
+              <a:cs typeface="Courier New" panose="02070309020205020404" pitchFamily="49" charset="0"/>
+            </a:endParaRPr>
+          </a:p>
+          <a:p>
+            <a:pPr marL="0" indent="0">
+              <a:buNone/>
+            </a:pPr>
+            <a:r>
+              <a:rPr lang="en-US" sz="3200" b="1" dirty="0"/>
+              <a:t>File: </a:t>
+            </a:r>
+          </a:p>
+          <a:p>
+            <a:pPr marL="0" indent="0">
+              <a:buNone/>
+            </a:pPr>
+            <a:r>
+              <a:rPr lang="en-US" sz="3200" b="1" dirty="0">
+                <a:latin typeface="Courier New" panose="02070309020205020404" pitchFamily="49" charset="0"/>
+                <a:cs typeface="Courier New" panose="02070309020205020404" pitchFamily="49" charset="0"/>
+              </a:rPr>
+              <a:t>	puppet resource file /www</a:t>
+            </a:r>
+          </a:p>
+          <a:p>
+            <a:pPr marL="0" indent="0">
+              <a:buNone/>
+            </a:pPr>
+            <a:r>
+              <a:rPr lang="en-US" sz="3200" b="1" dirty="0" smtClean="0"/>
+              <a:t>Service: </a:t>
+            </a:r>
+          </a:p>
+          <a:p>
+            <a:pPr marL="0" indent="0">
+              <a:buNone/>
+            </a:pPr>
+            <a:r>
+              <a:rPr lang="en-US" sz="3200" b="1" dirty="0">
+                <a:latin typeface="Courier New" panose="02070309020205020404" pitchFamily="49" charset="0"/>
+                <a:cs typeface="Courier New" panose="02070309020205020404" pitchFamily="49" charset="0"/>
+              </a:rPr>
+              <a:t>	</a:t>
+            </a:r>
+            <a:r>
+              <a:rPr lang="en-US" sz="3200" b="1" dirty="0" smtClean="0">
+                <a:latin typeface="Courier New" panose="02070309020205020404" pitchFamily="49" charset="0"/>
+                <a:cs typeface="Courier New" panose="02070309020205020404" pitchFamily="49" charset="0"/>
+              </a:rPr>
+              <a:t>puppet </a:t>
+            </a:r>
+            <a:r>
+              <a:rPr lang="en-US" sz="3200" b="1" dirty="0">
+                <a:latin typeface="Courier New" panose="02070309020205020404" pitchFamily="49" charset="0"/>
+                <a:cs typeface="Courier New" panose="02070309020205020404" pitchFamily="49" charset="0"/>
+              </a:rPr>
+              <a:t>resource service </a:t>
+            </a:r>
+            <a:r>
+              <a:rPr lang="en-US" sz="3200" b="1" dirty="0" smtClean="0">
+                <a:latin typeface="Courier New" panose="02070309020205020404" pitchFamily="49" charset="0"/>
+                <a:cs typeface="Courier New" panose="02070309020205020404" pitchFamily="49" charset="0"/>
+              </a:rPr>
+              <a:t>apache2</a:t>
+            </a:r>
           </a:p>
         </p:txBody>
       </p:sp>
     </p:spTree>
     <p:extLst>
       <p:ext uri="{BB962C8B-B14F-4D97-AF65-F5344CB8AC3E}">
-        <p14:creationId xmlns:p14="http://schemas.microsoft.com/office/powerpoint/2010/main" val="241596481"/>
+        <p14:creationId xmlns:p14="http://schemas.microsoft.com/office/powerpoint/2010/main" val="3576526012"/>
       </p:ext>
     </p:extLst>
   </p:cSld>
@@ -5940,11 +5986,7 @@
           <a:p>
             <a:r>
               <a:rPr lang="en-US" dirty="0" smtClean="0"/>
-              <a:t>Demo Step #1: </a:t>
-            </a:r>
-            <a:r>
-              <a:rPr lang="en-US" dirty="0" smtClean="0"/>
-              <a:t>Install Puppet</a:t>
+              <a:t>DEMO</a:t>
             </a:r>
             <a:endParaRPr lang="en-US" dirty="0"/>
           </a:p>
@@ -5960,105 +6002,84 @@
             <p:ph idx="1"/>
           </p:nvPr>
         </p:nvSpPr>
-        <p:spPr/>
-        <p:txBody>
-          <a:bodyPr/>
-          <a:lstStyle/>
-          <a:p>
-            <a:pPr marL="0" indent="0">
-              <a:buNone/>
+        <p:spPr>
+          <a:xfrm>
+            <a:off x="676656" y="2011680"/>
+            <a:ext cx="10753725" cy="4531010"/>
+          </a:xfrm>
+        </p:spPr>
+        <p:txBody>
+          <a:bodyPr>
+            <a:normAutofit/>
+          </a:bodyPr>
+          <a:lstStyle/>
+          <a:p>
+            <a:pPr marL="457200" indent="-457200">
+              <a:buFont typeface="+mj-lt"/>
+              <a:buAutoNum type="arabicPeriod"/>
             </a:pPr>
             <a:r>
               <a:rPr lang="en-US" sz="3200" b="1" dirty="0" smtClean="0"/>
-              <a:t># Install Puppet (on Ubuntu 12.04 LTS)</a:t>
-            </a:r>
-          </a:p>
-          <a:p>
-            <a:pPr marL="0" indent="0">
-              <a:buNone/>
+              <a:t>Install the latest version of Puppet Enterprise.  Search the Puppet Forge to find the modules we need to reach our goal.</a:t>
+            </a:r>
+            <a:br>
+              <a:rPr lang="en-US" sz="3200" b="1" dirty="0" smtClean="0"/>
+            </a:br>
+            <a:endParaRPr lang="en-US" sz="3200" b="1" dirty="0" smtClean="0"/>
+          </a:p>
+          <a:p>
+            <a:pPr marL="457200" indent="-457200">
+              <a:buFont typeface="+mj-lt"/>
+              <a:buAutoNum type="arabicPeriod"/>
             </a:pPr>
             <a:r>
+              <a:rPr lang="en-US" sz="3200" b="1" dirty="0" smtClean="0"/>
+              <a:t>Check the environment before we install and apply modules</a:t>
+            </a:r>
+            <a:br>
+              <a:rPr lang="en-US" sz="3200" b="1" dirty="0" smtClean="0"/>
+            </a:br>
+            <a:endParaRPr lang="en-US" sz="3200" b="1" dirty="0" smtClean="0"/>
+          </a:p>
+          <a:p>
+            <a:pPr marL="457200" indent="-457200">
+              <a:buFont typeface="+mj-lt"/>
+              <a:buAutoNum type="arabicPeriod"/>
+            </a:pPr>
+            <a:r>
+              <a:rPr lang="en-US" sz="3200" b="1" dirty="0" smtClean="0"/>
+              <a:t>Install apache and </a:t>
+            </a:r>
+            <a:r>
               <a:rPr lang="en-US" sz="3200" b="1" dirty="0" err="1" smtClean="0"/>
-              <a:t>wget</a:t>
+              <a:t>vcsrepo</a:t>
             </a:r>
             <a:r>
               <a:rPr lang="en-US" sz="3200" b="1" dirty="0" smtClean="0"/>
-              <a:t> https://apt.puppetlabs.com/puppetlabs-release-precise.deb</a:t>
-            </a:r>
-          </a:p>
-          <a:p>
-            <a:pPr marL="0" indent="0">
-              <a:buNone/>
+              <a:t> modules; Draft and apply a manifest</a:t>
+            </a:r>
+            <a:br>
+              <a:rPr lang="en-US" sz="3200" b="1" dirty="0" smtClean="0"/>
+            </a:br>
+            <a:endParaRPr lang="en-US" sz="3200" b="1" dirty="0" smtClean="0"/>
+          </a:p>
+          <a:p>
+            <a:pPr marL="457200" indent="-457200">
+              <a:buFont typeface="+mj-lt"/>
+              <a:buAutoNum type="arabicPeriod"/>
             </a:pPr>
             <a:r>
-              <a:rPr lang="en-US" sz="3200" b="1" dirty="0" err="1" smtClean="0"/>
-              <a:t>dpkg</a:t>
-            </a:r>
-            <a:r>
               <a:rPr lang="en-US" sz="3200" b="1" dirty="0" smtClean="0"/>
-              <a:t> -</a:t>
-            </a:r>
-            <a:r>
-              <a:rPr lang="en-US" sz="3200" b="1" dirty="0" err="1" smtClean="0"/>
-              <a:t>i</a:t>
-            </a:r>
-            <a:r>
-              <a:rPr lang="en-US" sz="3200" b="1" dirty="0" smtClean="0"/>
-              <a:t> </a:t>
-            </a:r>
-            <a:r>
-              <a:rPr lang="en-US" sz="3200" b="1" dirty="0" err="1" smtClean="0"/>
-              <a:t>puppetlabs</a:t>
-            </a:r>
-            <a:r>
-              <a:rPr lang="en-US" sz="3200" b="1" dirty="0" smtClean="0"/>
-              <a:t>-release-</a:t>
-            </a:r>
-            <a:r>
-              <a:rPr lang="en-US" sz="3200" b="1" dirty="0" err="1" smtClean="0"/>
-              <a:t>precise.deb</a:t>
-            </a:r>
-            <a:r>
-              <a:rPr lang="en-US" sz="3200" b="1" dirty="0" smtClean="0"/>
-              <a:t> </a:t>
-            </a:r>
-          </a:p>
-          <a:p>
-            <a:pPr marL="0" indent="0">
-              <a:buNone/>
-            </a:pPr>
-            <a:r>
-              <a:rPr lang="en-US" sz="3200" b="1" dirty="0" smtClean="0"/>
-              <a:t>apt-get update</a:t>
-            </a:r>
-          </a:p>
-          <a:p>
-            <a:pPr marL="0" indent="0">
-              <a:buNone/>
-            </a:pPr>
-            <a:r>
-              <a:rPr lang="en-US" sz="3200" b="1" dirty="0" smtClean="0"/>
-              <a:t>apt-get install -y puppet</a:t>
-            </a:r>
-          </a:p>
-          <a:p>
-            <a:pPr marL="0" indent="0">
-              <a:buNone/>
-            </a:pPr>
-            <a:r>
-              <a:rPr lang="en-US" sz="3200" b="1" dirty="0" smtClean="0"/>
-              <a:t>puppet --version</a:t>
-            </a:r>
-          </a:p>
-          <a:p>
-            <a:endParaRPr lang="en-US" dirty="0"/>
+              <a:t>Check the environment to confirm and validate the installations</a:t>
+            </a:r>
+            <a:endParaRPr lang="en-US" sz="3200" b="1" dirty="0"/>
           </a:p>
         </p:txBody>
       </p:sp>
     </p:spTree>
     <p:extLst>
       <p:ext uri="{BB962C8B-B14F-4D97-AF65-F5344CB8AC3E}">
-        <p14:creationId xmlns:p14="http://schemas.microsoft.com/office/powerpoint/2010/main" val="3880206058"/>
+        <p14:creationId xmlns:p14="http://schemas.microsoft.com/office/powerpoint/2010/main" val="410252703"/>
       </p:ext>
     </p:extLst>
   </p:cSld>
@@ -6094,12 +6115,12 @@
       </p:grpSpPr>
       <p:sp>
         <p:nvSpPr>
-          <p:cNvPr id="2" name="Title 1"/>
-          <p:cNvSpPr>
-            <a:spLocks noGrp="1"/>
-          </p:cNvSpPr>
-          <p:nvPr>
-            <p:ph type="title"/>
+          <p:cNvPr id="4" name="Title 3"/>
+          <p:cNvSpPr>
+            <a:spLocks noGrp="1"/>
+          </p:cNvSpPr>
+          <p:nvPr>
+            <p:ph type="ctrTitle"/>
           </p:nvPr>
         </p:nvSpPr>
         <p:spPr/>
@@ -6108,125 +6129,36 @@
           <a:lstStyle/>
           <a:p>
             <a:r>
-              <a:rPr lang="en-US" smtClean="0"/>
-              <a:t>Demo Step #2: Pre-Check</a:t>
-            </a:r>
-            <a:endParaRPr lang="en-US" dirty="0"/>
-          </a:p>
-        </p:txBody>
-      </p:sp>
-      <p:sp>
-        <p:nvSpPr>
-          <p:cNvPr id="3" name="Content Placeholder 2"/>
-          <p:cNvSpPr>
-            <a:spLocks noGrp="1"/>
-          </p:cNvSpPr>
-          <p:nvPr>
-            <p:ph idx="1"/>
-          </p:nvPr>
-        </p:nvSpPr>
-        <p:spPr/>
-        <p:txBody>
-          <a:bodyPr>
-            <a:noAutofit/>
-          </a:bodyPr>
-          <a:lstStyle/>
-          <a:p>
-            <a:pPr marL="0" indent="0">
-              <a:buNone/>
-            </a:pPr>
-            <a:r>
-              <a:rPr lang="en-US" sz="3200" b="1" dirty="0" smtClean="0"/>
-              <a:t># Check the Environment Before installing and applying modules</a:t>
-            </a:r>
-          </a:p>
-          <a:p>
-            <a:pPr marL="0" indent="0">
-              <a:buNone/>
-            </a:pPr>
-            <a:r>
-              <a:rPr lang="en-US" sz="3200" b="1" dirty="0"/>
-              <a:t>puppet module list</a:t>
-            </a:r>
-          </a:p>
-          <a:p>
-            <a:pPr marL="0" indent="0">
-              <a:buNone/>
-            </a:pPr>
-            <a:r>
-              <a:rPr lang="en-US" sz="3200" b="1" dirty="0" smtClean="0"/>
-              <a:t>which </a:t>
-            </a:r>
-            <a:r>
-              <a:rPr lang="en-US" sz="3200" b="1" dirty="0" err="1" smtClean="0"/>
-              <a:t>git</a:t>
-            </a:r>
-            <a:endParaRPr lang="en-US" sz="3200" b="1" dirty="0" smtClean="0"/>
-          </a:p>
-          <a:p>
-            <a:pPr marL="0" indent="0">
-              <a:buNone/>
-            </a:pPr>
-            <a:r>
-              <a:rPr lang="en-US" sz="3200" b="1" dirty="0" smtClean="0"/>
-              <a:t>puppet resource package </a:t>
-            </a:r>
-            <a:r>
-              <a:rPr lang="en-US" sz="3200" b="1" dirty="0" err="1" smtClean="0"/>
-              <a:t>git</a:t>
-            </a:r>
-            <a:endParaRPr lang="en-US" sz="3200" b="1" dirty="0" smtClean="0"/>
-          </a:p>
-          <a:p>
-            <a:pPr marL="0" indent="0">
-              <a:buNone/>
-            </a:pPr>
-            <a:r>
-              <a:rPr lang="en-US" sz="3200" b="1" dirty="0" smtClean="0"/>
-              <a:t>service apache2 status</a:t>
-            </a:r>
-          </a:p>
-          <a:p>
-            <a:pPr marL="0" indent="0">
-              <a:buNone/>
-            </a:pPr>
-            <a:r>
-              <a:rPr lang="en-US" sz="3200" b="1" dirty="0" smtClean="0"/>
-              <a:t>puppet resource service apache2</a:t>
-            </a:r>
-          </a:p>
-          <a:p>
-            <a:pPr marL="0" indent="0">
-              <a:buNone/>
-            </a:pPr>
-            <a:r>
-              <a:rPr lang="en-US" sz="3200" b="1" dirty="0" smtClean="0"/>
-              <a:t>curl -s -w "%{</a:t>
-            </a:r>
-            <a:r>
-              <a:rPr lang="en-US" sz="3200" b="1" dirty="0" err="1" smtClean="0"/>
-              <a:t>http_code</a:t>
-            </a:r>
-            <a:r>
-              <a:rPr lang="en-US" sz="3200" b="1" dirty="0" smtClean="0"/>
-              <a:t>}\n" -o /</a:t>
-            </a:r>
-            <a:r>
-              <a:rPr lang="en-US" sz="3200" b="1" dirty="0" err="1" smtClean="0"/>
-              <a:t>dev</a:t>
-            </a:r>
-            <a:r>
-              <a:rPr lang="en-US" sz="3200" b="1" dirty="0" smtClean="0"/>
-              <a:t>/null `hostname`.cloudapp.net</a:t>
-            </a:r>
-            <a:endParaRPr lang="en-US" sz="3200" b="1" dirty="0"/>
+              <a:rPr lang="en-US" b="1" dirty="0" smtClean="0"/>
+              <a:t>BACKUP INFO</a:t>
+            </a:r>
+            <a:endParaRPr lang="en-US" b="1" dirty="0"/>
+          </a:p>
+        </p:txBody>
+      </p:sp>
+      <p:sp>
+        <p:nvSpPr>
+          <p:cNvPr id="5" name="Subtitle 4"/>
+          <p:cNvSpPr>
+            <a:spLocks noGrp="1"/>
+          </p:cNvSpPr>
+          <p:nvPr>
+            <p:ph type="subTitle" idx="1"/>
+          </p:nvPr>
+        </p:nvSpPr>
+        <p:spPr/>
+        <p:txBody>
+          <a:bodyPr/>
+          <a:lstStyle/>
+          <a:p>
+            <a:endParaRPr lang="en-US"/>
           </a:p>
         </p:txBody>
       </p:sp>
     </p:spTree>
     <p:extLst>
       <p:ext uri="{BB962C8B-B14F-4D97-AF65-F5344CB8AC3E}">
-        <p14:creationId xmlns:p14="http://schemas.microsoft.com/office/powerpoint/2010/main" val="4070014121"/>
+        <p14:creationId xmlns:p14="http://schemas.microsoft.com/office/powerpoint/2010/main" val="241596481"/>
       </p:ext>
     </p:extLst>
   </p:cSld>
@@ -6277,15 +6209,7 @@
           <a:p>
             <a:r>
               <a:rPr lang="en-US" dirty="0" smtClean="0"/>
-              <a:t>Demo Step #3: </a:t>
-            </a:r>
-            <a:r>
-              <a:rPr lang="en-US" dirty="0"/>
-              <a:t>Install </a:t>
-            </a:r>
-            <a:r>
-              <a:rPr lang="en-US" dirty="0" smtClean="0"/>
-              <a:t>Modules</a:t>
+              <a:t>Demo Step #1: Install Puppet</a:t>
             </a:r>
             <a:endParaRPr lang="en-US" dirty="0"/>
           </a:p>
@@ -6303,9 +6227,7 @@
         </p:nvSpPr>
         <p:spPr/>
         <p:txBody>
-          <a:bodyPr>
-            <a:normAutofit/>
-          </a:bodyPr>
+          <a:bodyPr/>
           <a:lstStyle/>
           <a:p>
             <a:pPr marL="0" indent="0">
@@ -6313,7 +6235,7 @@
             </a:pPr>
             <a:r>
               <a:rPr lang="en-US" sz="3200" b="1" dirty="0" smtClean="0"/>
-              <a:t># Install the modules and apply a puppet manifest</a:t>
+              <a:t># Install Puppet (on Ubuntu 12.04 LTS)</a:t>
             </a:r>
           </a:p>
           <a:p>
@@ -6321,34 +6243,49 @@
               <a:buNone/>
             </a:pPr>
             <a:r>
+              <a:rPr lang="en-US" sz="3200" b="1" dirty="0" err="1" smtClean="0"/>
+              <a:t>wget</a:t>
+            </a:r>
+            <a:r>
               <a:rPr lang="en-US" sz="3200" b="1" dirty="0" smtClean="0"/>
-              <a:t>puppet </a:t>
-            </a:r>
-            <a:r>
-              <a:rPr lang="en-US" sz="3200" b="1" dirty="0"/>
-              <a:t>module install </a:t>
-            </a:r>
-            <a:r>
-              <a:rPr lang="en-US" sz="3200" b="1" dirty="0" err="1"/>
-              <a:t>puppetlabs-vcsrepo</a:t>
-            </a:r>
-            <a:endParaRPr lang="en-US" sz="3200" b="1" dirty="0"/>
+              <a:t> https://apt.puppetlabs.com/puppetlabs-release-precise.deb</a:t>
+            </a:r>
           </a:p>
           <a:p>
             <a:pPr marL="0" indent="0">
               <a:buNone/>
             </a:pPr>
             <a:r>
-              <a:rPr lang="en-US" sz="3200" b="1" dirty="0"/>
-              <a:t>puppet module install </a:t>
-            </a:r>
-            <a:r>
-              <a:rPr lang="en-US" sz="3200" b="1" dirty="0" err="1"/>
+              <a:rPr lang="en-US" sz="3200" b="1" dirty="0" err="1" smtClean="0"/>
+              <a:t>dpkg</a:t>
+            </a:r>
+            <a:r>
+              <a:rPr lang="en-US" sz="3200" b="1" dirty="0" smtClean="0"/>
+              <a:t> -</a:t>
+            </a:r>
+            <a:r>
+              <a:rPr lang="en-US" sz="3200" b="1" dirty="0" err="1" smtClean="0"/>
+              <a:t>i</a:t>
+            </a:r>
+            <a:r>
+              <a:rPr lang="en-US" sz="3200" b="1" dirty="0" smtClean="0"/>
+              <a:t> </a:t>
+            </a:r>
+            <a:r>
+              <a:rPr lang="en-US" sz="3200" b="1" dirty="0" err="1" smtClean="0"/>
               <a:t>puppetlabs</a:t>
             </a:r>
             <a:r>
-              <a:rPr lang="en-US" sz="3200" b="1" dirty="0"/>
-              <a:t>-apache</a:t>
+              <a:rPr lang="en-US" sz="3200" b="1" dirty="0" smtClean="0"/>
+              <a:t>-release-</a:t>
+            </a:r>
+            <a:r>
+              <a:rPr lang="en-US" sz="3200" b="1" dirty="0" err="1" smtClean="0"/>
+              <a:t>precise.deb</a:t>
+            </a:r>
+            <a:r>
+              <a:rPr lang="en-US" sz="3200" b="1" dirty="0" smtClean="0"/>
+              <a:t> </a:t>
             </a:r>
           </a:p>
           <a:p>
@@ -6356,12 +6293,8 @@
               <a:buNone/>
             </a:pPr>
             <a:r>
-              <a:rPr lang="en-US" sz="3200" b="1" dirty="0" err="1"/>
-              <a:t>wget</a:t>
-            </a:r>
-            <a:r>
-              <a:rPr lang="en-US" sz="3200" b="1" dirty="0"/>
-              <a:t> https://raw.githubusercontent.com/managedkaos/puppet-forge-intro/master/apache-vcsrepo.pp</a:t>
+              <a:rPr lang="en-US" sz="3200" b="1" dirty="0" smtClean="0"/>
+              <a:t>apt-get update</a:t>
             </a:r>
           </a:p>
           <a:p>
@@ -6369,29 +6302,28 @@
               <a:buNone/>
             </a:pPr>
             <a:r>
-              <a:rPr lang="en-US" sz="3200" b="1" dirty="0" err="1"/>
-              <a:t>sudo</a:t>
-            </a:r>
-            <a:r>
-              <a:rPr lang="en-US" sz="3200" b="1" dirty="0"/>
-              <a:t> puppet apply apache-</a:t>
-            </a:r>
-            <a:r>
-              <a:rPr lang="en-US" sz="3200" b="1" dirty="0" err="1"/>
-              <a:t>vcsrepo</a:t>
-            </a:r>
-            <a:r>
-              <a:rPr lang="en-US" sz="3200" b="1" dirty="0" err="1" smtClean="0"/>
-              <a:t>.pp</a:t>
-            </a:r>
-            <a:endParaRPr lang="en-US" sz="3200" b="1" dirty="0"/>
+              <a:rPr lang="en-US" sz="3200" b="1" dirty="0" smtClean="0"/>
+              <a:t>apt-get install -y puppet</a:t>
+            </a:r>
+          </a:p>
+          <a:p>
+            <a:pPr marL="0" indent="0">
+              <a:buNone/>
+            </a:pPr>
+            <a:r>
+              <a:rPr lang="en-US" sz="3200" b="1" dirty="0" smtClean="0"/>
+              <a:t>puppet --version</a:t>
+            </a:r>
+          </a:p>
+          <a:p>
+            <a:endParaRPr lang="en-US" dirty="0"/>
           </a:p>
         </p:txBody>
       </p:sp>
     </p:spTree>
     <p:extLst>
       <p:ext uri="{BB962C8B-B14F-4D97-AF65-F5344CB8AC3E}">
-        <p14:creationId xmlns:p14="http://schemas.microsoft.com/office/powerpoint/2010/main" val="1287452565"/>
+        <p14:creationId xmlns:p14="http://schemas.microsoft.com/office/powerpoint/2010/main" val="3880206058"/>
       </p:ext>
     </p:extLst>
   </p:cSld>
@@ -6441,16 +6373,8 @@
           <a:lstStyle/>
           <a:p>
             <a:r>
-              <a:rPr lang="en-US" dirty="0" smtClean="0"/>
-              <a:t>Demo Step #4</a:t>
-            </a:r>
-            <a:r>
-              <a:rPr lang="en-US" dirty="0"/>
-              <a:t>: </a:t>
-            </a:r>
-            <a:r>
-              <a:rPr lang="en-US" dirty="0" smtClean="0"/>
-              <a:t>Post-Check</a:t>
+              <a:rPr lang="en-US" smtClean="0"/>
+              <a:t>Demo Step #2: Pre-Check</a:t>
             </a:r>
             <a:endParaRPr lang="en-US" dirty="0"/>
           </a:p>
@@ -6469,7 +6393,7 @@
         <p:spPr/>
         <p:txBody>
           <a:bodyPr>
-            <a:normAutofit/>
+            <a:noAutofit/>
           </a:bodyPr>
           <a:lstStyle/>
           <a:p>
@@ -6478,7 +6402,7 @@
             </a:pPr>
             <a:r>
               <a:rPr lang="en-US" sz="3200" b="1" dirty="0" smtClean="0"/>
-              <a:t># Confirm that the modules, applications, and site are installed</a:t>
+              <a:t># Check the Environment Before installing and applying modules</a:t>
             </a:r>
           </a:p>
           <a:p>
@@ -6486,74 +6410,88 @@
               <a:buNone/>
             </a:pPr>
             <a:r>
+              <a:rPr lang="en-US" sz="3200" b="1" dirty="0"/>
+              <a:t>puppet module list</a:t>
+            </a:r>
+          </a:p>
+          <a:p>
+            <a:pPr marL="0" indent="0">
+              <a:buNone/>
+            </a:pPr>
+            <a:r>
               <a:rPr lang="en-US" sz="3200" b="1" dirty="0" smtClean="0"/>
-              <a:t>puppet module list</a:t>
+              <a:t>which </a:t>
+            </a:r>
+            <a:r>
+              <a:rPr lang="en-US" sz="3200" b="1" dirty="0" err="1" smtClean="0"/>
+              <a:t>git</a:t>
+            </a:r>
+            <a:endParaRPr lang="en-US" sz="3200" b="1" dirty="0" smtClean="0"/>
+          </a:p>
+          <a:p>
+            <a:pPr marL="0" indent="0">
+              <a:buNone/>
+            </a:pPr>
+            <a:r>
+              <a:rPr lang="en-US" sz="3200" b="1" dirty="0" smtClean="0"/>
+              <a:t>puppet resource package </a:t>
+            </a:r>
+            <a:r>
+              <a:rPr lang="en-US" sz="3200" b="1" dirty="0" err="1" smtClean="0"/>
+              <a:t>git</a:t>
+            </a:r>
+            <a:endParaRPr lang="en-US" sz="3200" b="1" dirty="0" smtClean="0"/>
+          </a:p>
+          <a:p>
+            <a:pPr marL="0" indent="0">
+              <a:buNone/>
+            </a:pPr>
+            <a:r>
+              <a:rPr lang="en-US" sz="3200" b="1" dirty="0" smtClean="0"/>
+              <a:t>service apache2 status</a:t>
+            </a:r>
+          </a:p>
+          <a:p>
+            <a:pPr marL="0" indent="0">
+              <a:buNone/>
+            </a:pPr>
+            <a:r>
+              <a:rPr lang="en-US" sz="3200" b="1" dirty="0" smtClean="0"/>
+              <a:t>puppet resource service apache2</a:t>
+            </a:r>
+          </a:p>
+          <a:p>
+            <a:pPr marL="0" indent="0">
+              <a:buNone/>
+            </a:pPr>
+            <a:r>
+              <a:rPr lang="en-US" sz="3200" b="1" dirty="0" smtClean="0"/>
+              <a:t>curl -s -w "%{</a:t>
+            </a:r>
+            <a:r>
+              <a:rPr lang="en-US" sz="3200" b="1" dirty="0" err="1" smtClean="0"/>
+              <a:t>http_code</a:t>
+            </a:r>
+            <a:r>
+              <a:rPr lang="en-US" sz="3200" b="1" dirty="0" smtClean="0"/>
+              <a:t>}\n" -o /</a:t>
+            </a:r>
+            <a:r>
+              <a:rPr lang="en-US" sz="3200" b="1" dirty="0" err="1" smtClean="0"/>
+              <a:t>dev</a:t>
+            </a:r>
+            <a:r>
+              <a:rPr lang="en-US" sz="3200" b="1" dirty="0" smtClean="0"/>
+              <a:t>/null `hostname`.cloudapp.net</a:t>
             </a:r>
             <a:endParaRPr lang="en-US" sz="3200" b="1" dirty="0"/>
-          </a:p>
-          <a:p>
-            <a:pPr marL="0" indent="0">
-              <a:buNone/>
-            </a:pPr>
-            <a:r>
-              <a:rPr lang="en-US" sz="3200" b="1" dirty="0"/>
-              <a:t>puppet resource package </a:t>
-            </a:r>
-            <a:r>
-              <a:rPr lang="en-US" sz="3200" b="1" dirty="0" err="1"/>
-              <a:t>git</a:t>
-            </a:r>
-            <a:endParaRPr lang="en-US" sz="3200" b="1" dirty="0"/>
-          </a:p>
-          <a:p>
-            <a:pPr marL="0" indent="0">
-              <a:buNone/>
-            </a:pPr>
-            <a:r>
-              <a:rPr lang="en-US" sz="3200" b="1" dirty="0"/>
-              <a:t>service apache2 status</a:t>
-            </a:r>
-          </a:p>
-          <a:p>
-            <a:pPr marL="0" indent="0">
-              <a:buNone/>
-            </a:pPr>
-            <a:r>
-              <a:rPr lang="en-US" sz="3200" b="1" dirty="0"/>
-              <a:t>puppet resource service apache2</a:t>
-            </a:r>
-          </a:p>
-          <a:p>
-            <a:pPr marL="0" indent="0">
-              <a:buNone/>
-            </a:pPr>
-            <a:r>
-              <a:rPr lang="en-US" sz="3200" b="1" dirty="0"/>
-              <a:t>curl -s -w "%{</a:t>
-            </a:r>
-            <a:r>
-              <a:rPr lang="en-US" sz="3200" b="1" dirty="0" err="1"/>
-              <a:t>http_code</a:t>
-            </a:r>
-            <a:r>
-              <a:rPr lang="en-US" sz="3200" b="1" dirty="0"/>
-              <a:t>}\n" -o /</a:t>
-            </a:r>
-            <a:r>
-              <a:rPr lang="en-US" sz="3200" b="1" dirty="0" err="1"/>
-              <a:t>dev</a:t>
-            </a:r>
-            <a:r>
-              <a:rPr lang="en-US" sz="3200" b="1" dirty="0"/>
-              <a:t>/null `hostname`.cloudapp.net</a:t>
-            </a:r>
           </a:p>
         </p:txBody>
       </p:sp>
     </p:spTree>
     <p:extLst>
       <p:ext uri="{BB962C8B-B14F-4D97-AF65-F5344CB8AC3E}">
-        <p14:creationId xmlns:p14="http://schemas.microsoft.com/office/powerpoint/2010/main" val="2685713885"/>
+        <p14:creationId xmlns:p14="http://schemas.microsoft.com/office/powerpoint/2010/main" val="4070014121"/>
       </p:ext>
     </p:extLst>
   </p:cSld>
@@ -6604,30 +6542,14 @@
           <a:p>
             <a:r>
               <a:rPr lang="en-US" b="1" dirty="0" smtClean="0"/>
-              <a:t>A Brief Introduction to </a:t>
-            </a:r>
-            <a:r>
-              <a:rPr lang="en-US" b="1" dirty="0" smtClean="0"/>
-              <a:t>The </a:t>
-            </a:r>
-            <a:r>
-              <a:rPr lang="en-US" b="1" dirty="0" smtClean="0"/>
-              <a:t>Puppet </a:t>
-            </a:r>
-            <a:r>
-              <a:rPr lang="en-US" b="1" dirty="0" smtClean="0"/>
-              <a:t>Forge</a:t>
+              <a:t>A Brief Introduction to The Puppet Forge</a:t>
             </a:r>
             <a:br>
               <a:rPr lang="en-US" b="1" dirty="0" smtClean="0"/>
             </a:br>
             <a:r>
               <a:rPr lang="en-US" b="1" dirty="0" smtClean="0"/>
-              <a:t>(</a:t>
-            </a:r>
-            <a:r>
-              <a:rPr lang="en-US" b="1" dirty="0" smtClean="0"/>
-              <a:t>and Modules)</a:t>
+              <a:t>(and Modules)</a:t>
             </a:r>
             <a:endParaRPr lang="en-US" b="1" dirty="0"/>
           </a:p>
@@ -6661,13 +6583,8 @@
             </a:r>
             <a:r>
               <a:rPr lang="en-US" sz="4800" b="1" baseline="0" dirty="0" smtClean="0"/>
-              <a:t>, Install, </a:t>
-            </a:r>
-            <a:r>
-              <a:rPr lang="en-US" sz="4800" b="1" baseline="0" dirty="0" smtClean="0"/>
-              <a:t>Apply</a:t>
-            </a:r>
-            <a:endParaRPr lang="en-US" sz="4800" b="1" baseline="0" dirty="0" smtClean="0"/>
+              <a:t>, Install, Apply</a:t>
+            </a:r>
           </a:p>
           <a:p>
             <a:endParaRPr lang="en-US" b="1" baseline="0" dirty="0" smtClean="0"/>
@@ -6741,15 +6658,15 @@
           <a:p>
             <a:r>
               <a:rPr lang="en-US" dirty="0" smtClean="0"/>
-              <a:t>Fixing the “</a:t>
-            </a:r>
-            <a:r>
-              <a:rPr lang="en-US" dirty="0" err="1" smtClean="0"/>
-              <a:t>templatedir</a:t>
+              <a:t>Demo Step #3: </a:t>
+            </a:r>
+            <a:r>
+              <a:rPr lang="en-US" dirty="0"/>
+              <a:t>Install </a:t>
             </a:r>
             <a:r>
               <a:rPr lang="en-US" dirty="0" smtClean="0"/>
-              <a:t>” Warning</a:t>
+              <a:t>Modules</a:t>
             </a:r>
             <a:endParaRPr lang="en-US" dirty="0"/>
           </a:p>
@@ -6765,244 +6682,97 @@
             <p:ph idx="1"/>
           </p:nvPr>
         </p:nvSpPr>
-        <p:spPr>
-          <a:xfrm>
-            <a:off x="676274" y="2157731"/>
-            <a:ext cx="10753725" cy="4337662"/>
-          </a:xfrm>
-        </p:spPr>
+        <p:spPr/>
         <p:txBody>
           <a:bodyPr>
-            <a:noAutofit/>
+            <a:normAutofit/>
           </a:bodyPr>
           <a:lstStyle/>
           <a:p>
-            <a:r>
-              <a:rPr lang="en-US" sz="2800" b="1" dirty="0" smtClean="0">
-                <a:solidFill>
-                  <a:schemeClr val="tx1"/>
-                </a:solidFill>
-              </a:rPr>
-              <a:t>If you </a:t>
-            </a:r>
-            <a:r>
-              <a:rPr lang="en-US" sz="2800" b="1" dirty="0">
-                <a:solidFill>
-                  <a:schemeClr val="tx1"/>
-                </a:solidFill>
-              </a:rPr>
-              <a:t>r</a:t>
-            </a:r>
-            <a:r>
-              <a:rPr lang="en-US" sz="2800" b="1" dirty="0" smtClean="0">
-                <a:solidFill>
-                  <a:schemeClr val="tx1"/>
-                </a:solidFill>
-              </a:rPr>
-              <a:t>un commands as root on a new install and see:</a:t>
-            </a:r>
-          </a:p>
-          <a:p>
-            <a:pPr lvl="1"/>
-            <a:r>
-              <a:rPr lang="en-US" b="1" dirty="0" smtClean="0">
-                <a:solidFill>
-                  <a:srgbClr val="FF0000"/>
-                </a:solidFill>
-              </a:rPr>
-              <a:t>Warning</a:t>
-            </a:r>
-            <a:r>
-              <a:rPr lang="en-US" b="1" dirty="0">
-                <a:solidFill>
-                  <a:srgbClr val="FF0000"/>
-                </a:solidFill>
-              </a:rPr>
-              <a:t>: Setting </a:t>
-            </a:r>
-            <a:r>
-              <a:rPr lang="en-US" b="1" dirty="0" err="1">
-                <a:solidFill>
-                  <a:srgbClr val="FF0000"/>
-                </a:solidFill>
-              </a:rPr>
-              <a:t>templatedir</a:t>
-            </a:r>
-            <a:r>
-              <a:rPr lang="en-US" b="1" dirty="0">
-                <a:solidFill>
-                  <a:srgbClr val="FF0000"/>
-                </a:solidFill>
-              </a:rPr>
-              <a:t> is deprecated. </a:t>
-            </a:r>
-            <a:endParaRPr lang="en-US" b="1" dirty="0" smtClean="0">
-              <a:solidFill>
-                <a:srgbClr val="FF0000"/>
-              </a:solidFill>
-            </a:endParaRPr>
-          </a:p>
-          <a:p>
-            <a:pPr lvl="1"/>
-            <a:r>
-              <a:rPr lang="en-US" b="1" dirty="0" smtClean="0">
-                <a:solidFill>
-                  <a:srgbClr val="FF0000"/>
-                </a:solidFill>
-              </a:rPr>
-              <a:t>See </a:t>
-            </a:r>
-            <a:r>
-              <a:rPr lang="en-US" b="1" dirty="0">
-                <a:solidFill>
-                  <a:srgbClr val="FF0000"/>
-                </a:solidFill>
-              </a:rPr>
-              <a:t>http://links.puppetlabs.com/env-settings-deprecations</a:t>
-            </a:r>
-          </a:p>
-          <a:p>
-            <a:pPr lvl="1"/>
-            <a:r>
-              <a:rPr lang="en-US" b="1" dirty="0">
-                <a:solidFill>
-                  <a:srgbClr val="FF0000"/>
-                </a:solidFill>
-              </a:rPr>
-              <a:t>   (at /</a:t>
-            </a:r>
-            <a:r>
-              <a:rPr lang="en-US" b="1" dirty="0" err="1">
-                <a:solidFill>
-                  <a:srgbClr val="FF0000"/>
-                </a:solidFill>
-              </a:rPr>
-              <a:t>usr</a:t>
-            </a:r>
-            <a:r>
-              <a:rPr lang="en-US" b="1" dirty="0">
-                <a:solidFill>
-                  <a:srgbClr val="FF0000"/>
-                </a:solidFill>
-              </a:rPr>
-              <a:t>/lib/ruby/</a:t>
-            </a:r>
-            <a:r>
-              <a:rPr lang="en-US" b="1" dirty="0" err="1">
-                <a:solidFill>
-                  <a:srgbClr val="FF0000"/>
-                </a:solidFill>
-              </a:rPr>
-              <a:t>vendor_ruby</a:t>
-            </a:r>
-            <a:r>
-              <a:rPr lang="en-US" b="1" dirty="0">
-                <a:solidFill>
-                  <a:srgbClr val="FF0000"/>
-                </a:solidFill>
-              </a:rPr>
-              <a:t>/puppet/settings.rb:1095:in `</a:t>
-            </a:r>
-            <a:r>
-              <a:rPr lang="en-US" b="1" dirty="0" err="1">
-                <a:solidFill>
-                  <a:srgbClr val="FF0000"/>
-                </a:solidFill>
-              </a:rPr>
-              <a:t>issue_deprecations</a:t>
-            </a:r>
-            <a:r>
-              <a:rPr lang="en-US" b="1" dirty="0">
-                <a:solidFill>
-                  <a:srgbClr val="FF0000"/>
-                </a:solidFill>
-              </a:rPr>
-              <a:t>')</a:t>
-            </a:r>
-          </a:p>
-          <a:p>
-            <a:endParaRPr lang="en-US" sz="2800" b="1" dirty="0"/>
-          </a:p>
-          <a:p>
-            <a:r>
-              <a:rPr lang="en-US" sz="2800" b="1" dirty="0" smtClean="0"/>
-              <a:t>Edit </a:t>
-            </a:r>
-            <a:r>
-              <a:rPr lang="en-US" sz="2800" b="1" dirty="0" err="1" smtClean="0"/>
-              <a:t>puppet.conf</a:t>
-            </a:r>
-            <a:r>
-              <a:rPr lang="en-US" sz="2800" b="1" dirty="0" smtClean="0"/>
-              <a:t> and comment </a:t>
-            </a:r>
-            <a:r>
-              <a:rPr lang="en-US" sz="2800" b="1" dirty="0"/>
-              <a:t>out “</a:t>
-            </a:r>
-            <a:r>
-              <a:rPr lang="en-US" sz="2800" b="1" dirty="0" err="1"/>
-              <a:t>templatedir</a:t>
-            </a:r>
-            <a:r>
-              <a:rPr lang="en-US" sz="2800" b="1" dirty="0"/>
-              <a:t>=$</a:t>
-            </a:r>
-            <a:r>
-              <a:rPr lang="en-US" sz="2800" b="1" dirty="0" err="1"/>
-              <a:t>confdir</a:t>
-            </a:r>
-            <a:r>
-              <a:rPr lang="en-US" sz="2800" b="1" dirty="0"/>
-              <a:t>/templates”</a:t>
-            </a:r>
-          </a:p>
-          <a:p>
-            <a:r>
-              <a:rPr lang="en-US" sz="2800" b="1" dirty="0" smtClean="0"/>
-              <a:t>$ </a:t>
-            </a:r>
-            <a:r>
-              <a:rPr lang="en-US" sz="2800" b="1" dirty="0" err="1"/>
+            <a:pPr marL="0" indent="0">
+              <a:buNone/>
+            </a:pPr>
+            <a:r>
+              <a:rPr lang="en-US" sz="3200" b="1" dirty="0" smtClean="0"/>
+              <a:t># Install the modules and apply a puppet manifest</a:t>
+            </a:r>
+          </a:p>
+          <a:p>
+            <a:pPr marL="0" indent="0">
+              <a:buNone/>
+            </a:pPr>
+            <a:r>
+              <a:rPr lang="en-US" sz="3200" b="1" dirty="0" smtClean="0"/>
+              <a:t>puppet </a:t>
+            </a:r>
+            <a:r>
+              <a:rPr lang="en-US" sz="3200" b="1" dirty="0"/>
+              <a:t>module install </a:t>
+            </a:r>
+            <a:r>
+              <a:rPr lang="en-US" sz="3200" b="1" dirty="0" err="1"/>
+              <a:t>puppetlabs-vcsrepo</a:t>
+            </a:r>
+            <a:endParaRPr lang="en-US" sz="3200" b="1" dirty="0"/>
+          </a:p>
+          <a:p>
+            <a:pPr marL="0" indent="0">
+              <a:buNone/>
+            </a:pPr>
+            <a:r>
+              <a:rPr lang="en-US" sz="3200" b="1" dirty="0"/>
+              <a:t>puppet module install </a:t>
+            </a:r>
+            <a:r>
+              <a:rPr lang="en-US" sz="3200" b="1" dirty="0" err="1"/>
+              <a:t>puppetlabs</a:t>
+            </a:r>
+            <a:r>
+              <a:rPr lang="en-US" sz="3200" b="1" dirty="0"/>
+              <a:t>-apache</a:t>
+            </a:r>
+          </a:p>
+          <a:p>
+            <a:pPr marL="0" indent="0">
+              <a:buNone/>
+            </a:pPr>
+            <a:r>
+              <a:rPr lang="en-US" sz="3200" b="1" dirty="0" err="1"/>
+              <a:t>wget</a:t>
+            </a:r>
+            <a:r>
+              <a:rPr lang="en-US" sz="3200" b="1" dirty="0"/>
+              <a:t> https://raw.githubusercontent.com/managedkaos/puppet-forge-intro/master/apache-vcsrepo.pp</a:t>
+            </a:r>
+          </a:p>
+          <a:p>
+            <a:pPr marL="0" indent="0">
+              <a:buNone/>
+            </a:pPr>
+            <a:r>
+              <a:rPr lang="en-US" sz="3200" b="1" dirty="0" err="1"/>
               <a:t>sudo</a:t>
             </a:r>
             <a:r>
-              <a:rPr lang="en-US" sz="2800" b="1" dirty="0"/>
-              <a:t> vi /</a:t>
-            </a:r>
-            <a:r>
-              <a:rPr lang="en-US" sz="2800" b="1" dirty="0" err="1" smtClean="0"/>
-              <a:t>etc</a:t>
-            </a:r>
-            <a:r>
-              <a:rPr lang="en-US" sz="2800" b="1" dirty="0" smtClean="0"/>
-              <a:t>/puppet/</a:t>
-            </a:r>
-            <a:r>
-              <a:rPr lang="en-US" sz="2800" b="1" dirty="0" err="1" smtClean="0"/>
-              <a:t>puppet.conf</a:t>
-            </a:r>
-            <a:endParaRPr lang="en-US" sz="2800" b="1" dirty="0" smtClean="0"/>
-          </a:p>
-          <a:p>
-            <a:endParaRPr lang="en-US" sz="2800" b="1" dirty="0"/>
-          </a:p>
-          <a:p>
-            <a:r>
-              <a:rPr lang="en-US" sz="2800" b="1" u="sng" dirty="0" smtClean="0">
-                <a:solidFill>
-                  <a:srgbClr val="FF0000"/>
-                </a:solidFill>
-              </a:rPr>
-              <a:t>This provides a quick fix for an annoyance but may introduce other issues!</a:t>
-            </a:r>
+              <a:rPr lang="en-US" sz="3200" b="1" dirty="0"/>
+              <a:t> puppet apply apache-</a:t>
+            </a:r>
+            <a:r>
+              <a:rPr lang="en-US" sz="3200" b="1" dirty="0" err="1"/>
+              <a:t>vcsrepo</a:t>
+            </a:r>
+            <a:r>
+              <a:rPr lang="en-US" sz="3200" b="1" dirty="0" err="1" smtClean="0"/>
+              <a:t>.pp</a:t>
+            </a:r>
+            <a:endParaRPr lang="en-US" sz="3200" b="1" dirty="0"/>
           </a:p>
         </p:txBody>
       </p:sp>
     </p:spTree>
     <p:extLst>
       <p:ext uri="{BB962C8B-B14F-4D97-AF65-F5344CB8AC3E}">
-        <p14:creationId xmlns:p14="http://schemas.microsoft.com/office/powerpoint/2010/main" val="370446325"/>
+        <p14:creationId xmlns:p14="http://schemas.microsoft.com/office/powerpoint/2010/main" val="1287452565"/>
       </p:ext>
     </p:extLst>
   </p:cSld>
@@ -7038,7 +6808,7 @@
       </p:grpSpPr>
       <p:sp>
         <p:nvSpPr>
-          <p:cNvPr id="5" name="Title 4"/>
+          <p:cNvPr id="2" name="Title 1"/>
           <p:cNvSpPr>
             <a:spLocks noGrp="1"/>
           </p:cNvSpPr>
@@ -7053,7 +6823,15 @@
           <a:p>
             <a:r>
               <a:rPr lang="en-US" dirty="0" smtClean="0"/>
-              <a:t>Installing Modules from Source</a:t>
+              <a:t>Demo Step #4</a:t>
+            </a:r>
+            <a:r>
+              <a:rPr lang="en-US" dirty="0"/>
+              <a:t>: </a:t>
+            </a:r>
+            <a:r>
+              <a:rPr lang="en-US" dirty="0" smtClean="0"/>
+              <a:t>Post-Check</a:t>
             </a:r>
             <a:endParaRPr lang="en-US" dirty="0"/>
           </a:p>
@@ -7061,7 +6839,7 @@
       </p:sp>
       <p:sp>
         <p:nvSpPr>
-          <p:cNvPr id="6" name="Content Placeholder 5"/>
+          <p:cNvPr id="3" name="Content Placeholder 2"/>
           <p:cNvSpPr>
             <a:spLocks noGrp="1"/>
           </p:cNvSpPr>
@@ -7069,98 +6847,94 @@
             <p:ph idx="1"/>
           </p:nvPr>
         </p:nvSpPr>
-        <p:spPr>
-          <a:xfrm>
-            <a:off x="676656" y="2011680"/>
-            <a:ext cx="10753725" cy="4524031"/>
-          </a:xfrm>
-        </p:spPr>
+        <p:spPr/>
         <p:txBody>
           <a:bodyPr>
             <a:normAutofit/>
           </a:bodyPr>
           <a:lstStyle/>
           <a:p>
-            <a:r>
-              <a:rPr lang="en-US" sz="2800" b="1" dirty="0" smtClean="0"/>
-              <a:t>Using “puppet module install” command may not always be an option</a:t>
-            </a:r>
-          </a:p>
-          <a:p>
-            <a:pPr lvl="1"/>
-            <a:r>
-              <a:rPr lang="en-US" sz="2800" b="1" dirty="0" smtClean="0"/>
-              <a:t>Examples: Disconnected networks, firewalls, local development</a:t>
-            </a:r>
-          </a:p>
-          <a:p>
-            <a:endParaRPr lang="en-US" sz="2800" b="1" dirty="0" smtClean="0"/>
-          </a:p>
-          <a:p>
-            <a:r>
-              <a:rPr lang="en-US" sz="2800" b="1" dirty="0" smtClean="0"/>
-              <a:t>Modules can be downloaded from the forge and installed manually</a:t>
-            </a:r>
-          </a:p>
-          <a:p>
-            <a:pPr lvl="1"/>
-            <a:r>
-              <a:rPr lang="en-US" sz="2800" b="1" dirty="0">
-                <a:hlinkClick r:id="rId2"/>
-              </a:rPr>
-              <a:t>http://</a:t>
-            </a:r>
-            <a:r>
-              <a:rPr lang="en-US" sz="2800" b="1" dirty="0" smtClean="0">
-                <a:hlinkClick r:id="rId2"/>
-              </a:rPr>
-              <a:t>docs.puppetlabs.com/puppet/latest/reference/modules_installing.html#installing-from-a-release-tarball</a:t>
-            </a:r>
-            <a:endParaRPr lang="en-US" sz="2800" b="1" dirty="0" smtClean="0"/>
-          </a:p>
-          <a:p>
-            <a:pPr lvl="1"/>
-            <a:r>
-              <a:rPr lang="en-US" sz="2800" b="1" dirty="0" smtClean="0"/>
-              <a:t>$ puppet </a:t>
-            </a:r>
-            <a:r>
-              <a:rPr lang="en-US" sz="2800" b="1" dirty="0"/>
-              <a:t>module install </a:t>
-            </a:r>
-            <a:r>
-              <a:rPr lang="en-US" sz="2800" b="1" dirty="0" smtClean="0"/>
-              <a:t>&lt;module name&gt;.tar.gz </a:t>
-            </a:r>
-            <a:r>
-              <a:rPr lang="en-US" sz="2800" b="1" dirty="0"/>
-              <a:t>--</a:t>
-            </a:r>
-            <a:r>
-              <a:rPr lang="en-US" sz="2800" b="1" dirty="0" smtClean="0"/>
-              <a:t>ignore-dependencies</a:t>
-            </a:r>
-          </a:p>
-          <a:p>
-            <a:pPr lvl="1"/>
-            <a:endParaRPr lang="en-US" sz="2800" b="1" dirty="0"/>
-          </a:p>
-          <a:p>
-            <a:pPr marL="4572" lvl="1" indent="0">
+            <a:pPr marL="0" indent="0">
               <a:buNone/>
             </a:pPr>
             <a:r>
-              <a:rPr lang="en-US" sz="2800" b="1" dirty="0" smtClean="0"/>
-              <a:t>Dependencies will have to be installed manually as well</a:t>
-            </a:r>
-            <a:endParaRPr lang="en-US" sz="2800" b="1" dirty="0"/>
+              <a:rPr lang="en-US" sz="3200" b="1" dirty="0" smtClean="0"/>
+              <a:t># Confirm that the modules, applications, and site are installed</a:t>
+            </a:r>
+          </a:p>
+          <a:p>
+            <a:pPr marL="0" indent="0">
+              <a:buNone/>
+            </a:pPr>
+            <a:r>
+              <a:rPr lang="en-US" sz="3200" b="1" dirty="0" smtClean="0"/>
+              <a:t>puppet module list</a:t>
+            </a:r>
+            <a:endParaRPr lang="en-US" sz="3200" b="1" dirty="0"/>
+          </a:p>
+          <a:p>
+            <a:pPr marL="0" indent="0">
+              <a:buNone/>
+            </a:pPr>
+            <a:r>
+              <a:rPr lang="en-US" sz="3200" b="1" dirty="0"/>
+              <a:t>puppet resource package </a:t>
+            </a:r>
+            <a:r>
+              <a:rPr lang="en-US" sz="3200" b="1" dirty="0" err="1"/>
+              <a:t>git</a:t>
+            </a:r>
+            <a:endParaRPr lang="en-US" sz="3200" b="1" dirty="0"/>
+          </a:p>
+          <a:p>
+            <a:pPr marL="0" indent="0">
+              <a:buNone/>
+            </a:pPr>
+            <a:r>
+              <a:rPr lang="en-US" sz="3200" b="1" dirty="0"/>
+              <a:t>service apache2 status</a:t>
+            </a:r>
+          </a:p>
+          <a:p>
+            <a:pPr marL="0" indent="0">
+              <a:buNone/>
+            </a:pPr>
+            <a:r>
+              <a:rPr lang="en-US" sz="3200" b="1" dirty="0"/>
+              <a:t>puppet resource service apache2</a:t>
+            </a:r>
+          </a:p>
+          <a:p>
+            <a:pPr marL="0" indent="0">
+              <a:buNone/>
+            </a:pPr>
+            <a:r>
+              <a:rPr lang="en-US" sz="3200" b="1" dirty="0"/>
+              <a:t>curl -s -w "%{</a:t>
+            </a:r>
+            <a:r>
+              <a:rPr lang="en-US" sz="3200" b="1" dirty="0" err="1"/>
+              <a:t>http_code</a:t>
+            </a:r>
+            <a:r>
+              <a:rPr lang="en-US" sz="3200" b="1" dirty="0"/>
+              <a:t>}\n" -o /</a:t>
+            </a:r>
+            <a:r>
+              <a:rPr lang="en-US" sz="3200" b="1" dirty="0" err="1"/>
+              <a:t>dev</a:t>
+            </a:r>
+            <a:r>
+              <a:rPr lang="en-US" sz="3200" b="1" dirty="0"/>
+              <a:t>/null `hostname`.cloudapp.net</a:t>
+            </a:r>
           </a:p>
         </p:txBody>
       </p:sp>
     </p:spTree>
     <p:extLst>
       <p:ext uri="{BB962C8B-B14F-4D97-AF65-F5344CB8AC3E}">
-        <p14:creationId xmlns:p14="http://schemas.microsoft.com/office/powerpoint/2010/main" val="990233093"/>
+        <p14:creationId xmlns:p14="http://schemas.microsoft.com/office/powerpoint/2010/main" val="2685713885"/>
       </p:ext>
     </p:extLst>
   </p:cSld>
@@ -7206,16 +6980,22 @@
         </p:nvSpPr>
         <p:spPr/>
         <p:txBody>
-          <a:bodyPr>
-            <a:normAutofit/>
-          </a:bodyPr>
-          <a:lstStyle/>
-          <a:p>
-            <a:r>
-              <a:rPr lang="en-US" sz="6600" dirty="0" smtClean="0"/>
-              <a:t>Puppet Help and Manual Pages</a:t>
-            </a:r>
-            <a:endParaRPr lang="en-US" sz="6600" dirty="0"/>
+          <a:bodyPr/>
+          <a:lstStyle/>
+          <a:p>
+            <a:r>
+              <a:rPr lang="en-US" dirty="0" smtClean="0"/>
+              <a:t>Fixing the “</a:t>
+            </a:r>
+            <a:r>
+              <a:rPr lang="en-US" dirty="0" err="1" smtClean="0"/>
+              <a:t>templatedir</a:t>
+            </a:r>
+            <a:r>
+              <a:rPr lang="en-US" dirty="0" smtClean="0"/>
+              <a:t>” Warning</a:t>
+            </a:r>
+            <a:endParaRPr lang="en-US" dirty="0"/>
           </a:p>
         </p:txBody>
       </p:sp>
@@ -7229,42 +7009,244 @@
             <p:ph idx="1"/>
           </p:nvPr>
         </p:nvSpPr>
-        <p:spPr/>
+        <p:spPr>
+          <a:xfrm>
+            <a:off x="676274" y="2157731"/>
+            <a:ext cx="10753725" cy="4337662"/>
+          </a:xfrm>
+        </p:spPr>
         <p:txBody>
           <a:bodyPr>
             <a:noAutofit/>
           </a:bodyPr>
           <a:lstStyle/>
           <a:p>
-            <a:endParaRPr lang="en-US" dirty="0" smtClean="0"/>
-          </a:p>
-          <a:p>
-            <a:r>
-              <a:rPr lang="en-US" dirty="0" smtClean="0"/>
-              <a:t>puppet help module – usage and overview</a:t>
-            </a:r>
-          </a:p>
-          <a:p>
-            <a:r>
-              <a:rPr lang="en-US" dirty="0" smtClean="0"/>
-              <a:t>puppet man module – detailed information, subcommands, options</a:t>
-            </a:r>
-          </a:p>
-          <a:p>
-            <a:r>
-              <a:rPr lang="en-US" dirty="0" smtClean="0"/>
-              <a:t>puppet help module search – usage and overview for the search subcommand</a:t>
-            </a:r>
-          </a:p>
-          <a:p>
-            <a:endParaRPr lang="en-US" dirty="0"/>
+            <a:r>
+              <a:rPr lang="en-US" sz="2800" b="1" dirty="0" smtClean="0">
+                <a:solidFill>
+                  <a:schemeClr val="tx1"/>
+                </a:solidFill>
+              </a:rPr>
+              <a:t>If you </a:t>
+            </a:r>
+            <a:r>
+              <a:rPr lang="en-US" sz="2800" b="1" dirty="0">
+                <a:solidFill>
+                  <a:schemeClr val="tx1"/>
+                </a:solidFill>
+              </a:rPr>
+              <a:t>r</a:t>
+            </a:r>
+            <a:r>
+              <a:rPr lang="en-US" sz="2800" b="1" dirty="0" smtClean="0">
+                <a:solidFill>
+                  <a:schemeClr val="tx1"/>
+                </a:solidFill>
+              </a:rPr>
+              <a:t>un commands as root on a new install and see:</a:t>
+            </a:r>
+          </a:p>
+          <a:p>
+            <a:pPr lvl="1"/>
+            <a:r>
+              <a:rPr lang="en-US" b="1" dirty="0" smtClean="0">
+                <a:solidFill>
+                  <a:srgbClr val="FF0000"/>
+                </a:solidFill>
+              </a:rPr>
+              <a:t>Warning</a:t>
+            </a:r>
+            <a:r>
+              <a:rPr lang="en-US" b="1" dirty="0">
+                <a:solidFill>
+                  <a:srgbClr val="FF0000"/>
+                </a:solidFill>
+              </a:rPr>
+              <a:t>: Setting </a:t>
+            </a:r>
+            <a:r>
+              <a:rPr lang="en-US" b="1" dirty="0" err="1">
+                <a:solidFill>
+                  <a:srgbClr val="FF0000"/>
+                </a:solidFill>
+              </a:rPr>
+              <a:t>templatedir</a:t>
+            </a:r>
+            <a:r>
+              <a:rPr lang="en-US" b="1" dirty="0">
+                <a:solidFill>
+                  <a:srgbClr val="FF0000"/>
+                </a:solidFill>
+              </a:rPr>
+              <a:t> is deprecated. </a:t>
+            </a:r>
+            <a:endParaRPr lang="en-US" b="1" dirty="0" smtClean="0">
+              <a:solidFill>
+                <a:srgbClr val="FF0000"/>
+              </a:solidFill>
+            </a:endParaRPr>
+          </a:p>
+          <a:p>
+            <a:pPr lvl="1"/>
+            <a:r>
+              <a:rPr lang="en-US" b="1" dirty="0" smtClean="0">
+                <a:solidFill>
+                  <a:srgbClr val="FF0000"/>
+                </a:solidFill>
+              </a:rPr>
+              <a:t>See </a:t>
+            </a:r>
+            <a:r>
+              <a:rPr lang="en-US" b="1" dirty="0">
+                <a:solidFill>
+                  <a:srgbClr val="FF0000"/>
+                </a:solidFill>
+              </a:rPr>
+              <a:t>http://links.puppetlabs.com/env-settings-deprecations</a:t>
+            </a:r>
+          </a:p>
+          <a:p>
+            <a:pPr lvl="1"/>
+            <a:r>
+              <a:rPr lang="en-US" b="1" dirty="0">
+                <a:solidFill>
+                  <a:srgbClr val="FF0000"/>
+                </a:solidFill>
+              </a:rPr>
+              <a:t>   (at /</a:t>
+            </a:r>
+            <a:r>
+              <a:rPr lang="en-US" b="1" dirty="0" err="1">
+                <a:solidFill>
+                  <a:srgbClr val="FF0000"/>
+                </a:solidFill>
+              </a:rPr>
+              <a:t>usr</a:t>
+            </a:r>
+            <a:r>
+              <a:rPr lang="en-US" b="1" dirty="0">
+                <a:solidFill>
+                  <a:srgbClr val="FF0000"/>
+                </a:solidFill>
+              </a:rPr>
+              <a:t>/lib/ruby/</a:t>
+            </a:r>
+            <a:r>
+              <a:rPr lang="en-US" b="1" dirty="0" err="1">
+                <a:solidFill>
+                  <a:srgbClr val="FF0000"/>
+                </a:solidFill>
+              </a:rPr>
+              <a:t>vendor_ruby</a:t>
+            </a:r>
+            <a:r>
+              <a:rPr lang="en-US" b="1" dirty="0">
+                <a:solidFill>
+                  <a:srgbClr val="FF0000"/>
+                </a:solidFill>
+              </a:rPr>
+              <a:t>/puppet/settings.rb:1095:in `</a:t>
+            </a:r>
+            <a:r>
+              <a:rPr lang="en-US" b="1" dirty="0" err="1">
+                <a:solidFill>
+                  <a:srgbClr val="FF0000"/>
+                </a:solidFill>
+              </a:rPr>
+              <a:t>issue_deprecations</a:t>
+            </a:r>
+            <a:r>
+              <a:rPr lang="en-US" b="1" dirty="0">
+                <a:solidFill>
+                  <a:srgbClr val="FF0000"/>
+                </a:solidFill>
+              </a:rPr>
+              <a:t>')</a:t>
+            </a:r>
+          </a:p>
+          <a:p>
+            <a:endParaRPr lang="en-US" sz="2800" b="1" dirty="0"/>
+          </a:p>
+          <a:p>
+            <a:r>
+              <a:rPr lang="en-US" sz="2800" b="1" dirty="0" smtClean="0"/>
+              <a:t>Edit </a:t>
+            </a:r>
+            <a:r>
+              <a:rPr lang="en-US" sz="2800" b="1" dirty="0" err="1" smtClean="0"/>
+              <a:t>puppet.conf</a:t>
+            </a:r>
+            <a:r>
+              <a:rPr lang="en-US" sz="2800" b="1" dirty="0" smtClean="0"/>
+              <a:t> and comment </a:t>
+            </a:r>
+            <a:r>
+              <a:rPr lang="en-US" sz="2800" b="1" dirty="0"/>
+              <a:t>out “</a:t>
+            </a:r>
+            <a:r>
+              <a:rPr lang="en-US" sz="2800" b="1" dirty="0" err="1"/>
+              <a:t>templatedir</a:t>
+            </a:r>
+            <a:r>
+              <a:rPr lang="en-US" sz="2800" b="1" dirty="0"/>
+              <a:t>=$</a:t>
+            </a:r>
+            <a:r>
+              <a:rPr lang="en-US" sz="2800" b="1" dirty="0" err="1"/>
+              <a:t>confdir</a:t>
+            </a:r>
+            <a:r>
+              <a:rPr lang="en-US" sz="2800" b="1" dirty="0"/>
+              <a:t>/templates”</a:t>
+            </a:r>
+          </a:p>
+          <a:p>
+            <a:r>
+              <a:rPr lang="en-US" sz="2800" b="1" dirty="0" smtClean="0"/>
+              <a:t>$ </a:t>
+            </a:r>
+            <a:r>
+              <a:rPr lang="en-US" sz="2800" b="1" dirty="0" err="1"/>
+              <a:t>sudo</a:t>
+            </a:r>
+            <a:r>
+              <a:rPr lang="en-US" sz="2800" b="1" dirty="0"/>
+              <a:t> vi /</a:t>
+            </a:r>
+            <a:r>
+              <a:rPr lang="en-US" sz="2800" b="1" dirty="0" err="1" smtClean="0"/>
+              <a:t>etc</a:t>
+            </a:r>
+            <a:r>
+              <a:rPr lang="en-US" sz="2800" b="1" dirty="0" smtClean="0"/>
+              <a:t>/puppet/</a:t>
+            </a:r>
+            <a:r>
+              <a:rPr lang="en-US" sz="2800" b="1" dirty="0" err="1" smtClean="0"/>
+              <a:t>puppet.conf</a:t>
+            </a:r>
+            <a:endParaRPr lang="en-US" sz="2800" b="1" dirty="0" smtClean="0"/>
+          </a:p>
+          <a:p>
+            <a:endParaRPr lang="en-US" sz="2800" b="1" dirty="0"/>
+          </a:p>
+          <a:p>
+            <a:r>
+              <a:rPr lang="en-US" sz="2800" b="1" u="sng" dirty="0" smtClean="0">
+                <a:solidFill>
+                  <a:srgbClr val="FF0000"/>
+                </a:solidFill>
+              </a:rPr>
+              <a:t>This provides a quick fix for an annoyance but may introduce other issues!</a:t>
+            </a:r>
           </a:p>
         </p:txBody>
       </p:sp>
     </p:spTree>
     <p:extLst>
       <p:ext uri="{BB962C8B-B14F-4D97-AF65-F5344CB8AC3E}">
-        <p14:creationId xmlns:p14="http://schemas.microsoft.com/office/powerpoint/2010/main" val="141852850"/>
+        <p14:creationId xmlns:p14="http://schemas.microsoft.com/office/powerpoint/2010/main" val="370446325"/>
       </p:ext>
     </p:extLst>
   </p:cSld>
@@ -7300,6 +7282,268 @@
       </p:grpSpPr>
       <p:sp>
         <p:nvSpPr>
+          <p:cNvPr id="5" name="Title 4"/>
+          <p:cNvSpPr>
+            <a:spLocks noGrp="1"/>
+          </p:cNvSpPr>
+          <p:nvPr>
+            <p:ph type="title"/>
+          </p:nvPr>
+        </p:nvSpPr>
+        <p:spPr/>
+        <p:txBody>
+          <a:bodyPr/>
+          <a:lstStyle/>
+          <a:p>
+            <a:r>
+              <a:rPr lang="en-US" dirty="0" smtClean="0"/>
+              <a:t>Installing Modules from Source</a:t>
+            </a:r>
+            <a:endParaRPr lang="en-US" dirty="0"/>
+          </a:p>
+        </p:txBody>
+      </p:sp>
+      <p:sp>
+        <p:nvSpPr>
+          <p:cNvPr id="6" name="Content Placeholder 5"/>
+          <p:cNvSpPr>
+            <a:spLocks noGrp="1"/>
+          </p:cNvSpPr>
+          <p:nvPr>
+            <p:ph idx="1"/>
+          </p:nvPr>
+        </p:nvSpPr>
+        <p:spPr>
+          <a:xfrm>
+            <a:off x="676656" y="2011680"/>
+            <a:ext cx="10753725" cy="4524031"/>
+          </a:xfrm>
+        </p:spPr>
+        <p:txBody>
+          <a:bodyPr>
+            <a:normAutofit/>
+          </a:bodyPr>
+          <a:lstStyle/>
+          <a:p>
+            <a:r>
+              <a:rPr lang="en-US" sz="2800" b="1" dirty="0" smtClean="0"/>
+              <a:t>Using “puppet module install” command may not always be an option</a:t>
+            </a:r>
+          </a:p>
+          <a:p>
+            <a:pPr lvl="1"/>
+            <a:r>
+              <a:rPr lang="en-US" sz="2800" b="1" dirty="0" smtClean="0"/>
+              <a:t>Examples: Disconnected networks, firewalls, local development</a:t>
+            </a:r>
+          </a:p>
+          <a:p>
+            <a:endParaRPr lang="en-US" sz="2800" b="1" dirty="0" smtClean="0"/>
+          </a:p>
+          <a:p>
+            <a:r>
+              <a:rPr lang="en-US" sz="2800" b="1" dirty="0" smtClean="0"/>
+              <a:t>Modules can be downloaded from the forge and installed manually</a:t>
+            </a:r>
+          </a:p>
+          <a:p>
+            <a:pPr lvl="1"/>
+            <a:r>
+              <a:rPr lang="en-US" sz="2800" b="1" dirty="0">
+                <a:hlinkClick r:id="rId2"/>
+              </a:rPr>
+              <a:t>http://</a:t>
+            </a:r>
+            <a:r>
+              <a:rPr lang="en-US" sz="2800" b="1" dirty="0" smtClean="0">
+                <a:hlinkClick r:id="rId2"/>
+              </a:rPr>
+              <a:t>docs.puppetlabs.com/puppet/latest/reference/modules_installing.html#installing-from-a-release-tarball</a:t>
+            </a:r>
+            <a:endParaRPr lang="en-US" sz="2800" b="1" dirty="0" smtClean="0"/>
+          </a:p>
+          <a:p>
+            <a:pPr lvl="1"/>
+            <a:r>
+              <a:rPr lang="en-US" sz="2800" b="1" dirty="0" smtClean="0"/>
+              <a:t>$ puppet </a:t>
+            </a:r>
+            <a:r>
+              <a:rPr lang="en-US" sz="2800" b="1" dirty="0"/>
+              <a:t>module install </a:t>
+            </a:r>
+            <a:r>
+              <a:rPr lang="en-US" sz="2800" b="1" dirty="0" smtClean="0"/>
+              <a:t>&lt;module name&gt;.tar.gz </a:t>
+            </a:r>
+            <a:r>
+              <a:rPr lang="en-US" sz="2800" b="1" dirty="0"/>
+              <a:t>--</a:t>
+            </a:r>
+            <a:r>
+              <a:rPr lang="en-US" sz="2800" b="1" dirty="0" smtClean="0"/>
+              <a:t>ignore-dependencies</a:t>
+            </a:r>
+          </a:p>
+          <a:p>
+            <a:pPr lvl="1"/>
+            <a:endParaRPr lang="en-US" sz="2800" b="1" dirty="0"/>
+          </a:p>
+          <a:p>
+            <a:pPr marL="4572" lvl="1" indent="0">
+              <a:buNone/>
+            </a:pPr>
+            <a:r>
+              <a:rPr lang="en-US" sz="2800" b="1" dirty="0" smtClean="0"/>
+              <a:t>Dependencies will have to be installed manually as well</a:t>
+            </a:r>
+            <a:endParaRPr lang="en-US" sz="2800" b="1" dirty="0"/>
+          </a:p>
+        </p:txBody>
+      </p:sp>
+    </p:spTree>
+    <p:extLst>
+      <p:ext uri="{BB962C8B-B14F-4D97-AF65-F5344CB8AC3E}">
+        <p14:creationId xmlns:p14="http://schemas.microsoft.com/office/powerpoint/2010/main" val="990233093"/>
+      </p:ext>
+    </p:extLst>
+  </p:cSld>
+  <p:clrMapOvr>
+    <a:masterClrMapping/>
+  </p:clrMapOvr>
+  <p:timing>
+    <p:tnLst>
+      <p:par>
+        <p:cTn id="1" dur="indefinite" restart="never" nodeType="tmRoot"/>
+      </p:par>
+    </p:tnLst>
+  </p:timing>
+</p:sld>
+</file>
+
+<file path=ppt/slides/slide24.xml><?xml version="1.0" encoding="utf-8"?>
+<p:sld xmlns:a="http://schemas.openxmlformats.org/drawingml/2006/main" xmlns:r="http://schemas.openxmlformats.org/officeDocument/2006/relationships" xmlns:p="http://schemas.openxmlformats.org/presentationml/2006/main">
+  <p:cSld>
+    <p:spTree>
+      <p:nvGrpSpPr>
+        <p:cNvPr id="1" name=""/>
+        <p:cNvGrpSpPr/>
+        <p:nvPr/>
+      </p:nvGrpSpPr>
+      <p:grpSpPr>
+        <a:xfrm>
+          <a:off x="0" y="0"/>
+          <a:ext cx="0" cy="0"/>
+          <a:chOff x="0" y="0"/>
+          <a:chExt cx="0" cy="0"/>
+        </a:xfrm>
+      </p:grpSpPr>
+      <p:sp>
+        <p:nvSpPr>
+          <p:cNvPr id="2" name="Title 1"/>
+          <p:cNvSpPr>
+            <a:spLocks noGrp="1"/>
+          </p:cNvSpPr>
+          <p:nvPr>
+            <p:ph type="title"/>
+          </p:nvPr>
+        </p:nvSpPr>
+        <p:spPr/>
+        <p:txBody>
+          <a:bodyPr>
+            <a:normAutofit/>
+          </a:bodyPr>
+          <a:lstStyle/>
+          <a:p>
+            <a:r>
+              <a:rPr lang="en-US" sz="6600" dirty="0" smtClean="0"/>
+              <a:t>Puppet Help and Manual Pages</a:t>
+            </a:r>
+            <a:endParaRPr lang="en-US" sz="6600" dirty="0"/>
+          </a:p>
+        </p:txBody>
+      </p:sp>
+      <p:sp>
+        <p:nvSpPr>
+          <p:cNvPr id="3" name="Content Placeholder 2"/>
+          <p:cNvSpPr>
+            <a:spLocks noGrp="1"/>
+          </p:cNvSpPr>
+          <p:nvPr>
+            <p:ph idx="1"/>
+          </p:nvPr>
+        </p:nvSpPr>
+        <p:spPr/>
+        <p:txBody>
+          <a:bodyPr>
+            <a:noAutofit/>
+          </a:bodyPr>
+          <a:lstStyle/>
+          <a:p>
+            <a:endParaRPr lang="en-US" dirty="0" smtClean="0"/>
+          </a:p>
+          <a:p>
+            <a:r>
+              <a:rPr lang="en-US" dirty="0" smtClean="0"/>
+              <a:t>puppet help module – usage and overview</a:t>
+            </a:r>
+          </a:p>
+          <a:p>
+            <a:r>
+              <a:rPr lang="en-US" dirty="0" smtClean="0"/>
+              <a:t>puppet man module – detailed information, subcommands, options</a:t>
+            </a:r>
+          </a:p>
+          <a:p>
+            <a:r>
+              <a:rPr lang="en-US" dirty="0" smtClean="0"/>
+              <a:t>puppet help module search – usage and overview for the search subcommand</a:t>
+            </a:r>
+          </a:p>
+          <a:p>
+            <a:endParaRPr lang="en-US" dirty="0"/>
+          </a:p>
+        </p:txBody>
+      </p:sp>
+    </p:spTree>
+    <p:extLst>
+      <p:ext uri="{BB962C8B-B14F-4D97-AF65-F5344CB8AC3E}">
+        <p14:creationId xmlns:p14="http://schemas.microsoft.com/office/powerpoint/2010/main" val="141852850"/>
+      </p:ext>
+    </p:extLst>
+  </p:cSld>
+  <p:clrMapOvr>
+    <a:masterClrMapping/>
+  </p:clrMapOvr>
+  <p:timing>
+    <p:tnLst>
+      <p:par>
+        <p:cTn id="1" dur="indefinite" restart="never" nodeType="tmRoot"/>
+      </p:par>
+    </p:tnLst>
+  </p:timing>
+</p:sld>
+</file>
+
+<file path=ppt/slides/slide25.xml><?xml version="1.0" encoding="utf-8"?>
+<p:sld xmlns:a="http://schemas.openxmlformats.org/drawingml/2006/main" xmlns:r="http://schemas.openxmlformats.org/officeDocument/2006/relationships" xmlns:p="http://schemas.openxmlformats.org/presentationml/2006/main">
+  <p:cSld>
+    <p:spTree>
+      <p:nvGrpSpPr>
+        <p:cNvPr id="1" name=""/>
+        <p:cNvGrpSpPr/>
+        <p:nvPr/>
+      </p:nvGrpSpPr>
+      <p:grpSpPr>
+        <a:xfrm>
+          <a:off x="0" y="0"/>
+          <a:ext cx="0" cy="0"/>
+          <a:chOff x="0" y="0"/>
+          <a:chExt cx="0" cy="0"/>
+        </a:xfrm>
+      </p:grpSpPr>
+      <p:sp>
+        <p:nvSpPr>
           <p:cNvPr id="2" name="Title 1"/>
           <p:cNvSpPr>
             <a:spLocks noGrp="1"/>
@@ -7433,7 +7677,7 @@
 </p:sld>
 </file>
 
-<file path=ppt/slides/slide24.xml><?xml version="1.0" encoding="utf-8"?>
+<file path=ppt/slides/slide26.xml><?xml version="1.0" encoding="utf-8"?>
 <p:sld xmlns:a="http://schemas.openxmlformats.org/drawingml/2006/main" xmlns:r="http://schemas.openxmlformats.org/officeDocument/2006/relationships" xmlns:p="http://schemas.openxmlformats.org/presentationml/2006/main">
   <p:cSld>
     <p:spTree>
@@ -8144,7 +8388,7 @@
       </p:grpSpPr>
       <p:sp>
         <p:nvSpPr>
-          <p:cNvPr id="2" name="Title 1"/>
+          <p:cNvPr id="5" name="Title 4"/>
           <p:cNvSpPr>
             <a:spLocks noGrp="1"/>
           </p:cNvSpPr>
@@ -8154,76 +8398,162 @@
         </p:nvSpPr>
         <p:spPr/>
         <p:txBody>
-          <a:bodyPr/>
-          <a:lstStyle/>
-          <a:p>
-            <a:r>
-              <a:rPr lang="en-US" b="1" dirty="0" smtClean="0"/>
-              <a:t>Find Modules – Check compatibility and installation details</a:t>
-            </a:r>
-            <a:endParaRPr lang="en-US" b="1" dirty="0"/>
-          </a:p>
-        </p:txBody>
-      </p:sp>
-      <p:sp>
-        <p:nvSpPr>
-          <p:cNvPr id="4" name="Text Placeholder 3"/>
-          <p:cNvSpPr>
-            <a:spLocks noGrp="1"/>
-          </p:cNvSpPr>
-          <p:nvPr>
-            <p:ph type="body" sz="half" idx="2"/>
-          </p:nvPr>
-        </p:nvSpPr>
-        <p:spPr/>
-        <p:txBody>
-          <a:bodyPr/>
-          <a:lstStyle/>
-          <a:p>
-            <a:endParaRPr lang="en-US"/>
-          </a:p>
-        </p:txBody>
-      </p:sp>
-      <p:sp>
-        <p:nvSpPr>
-          <p:cNvPr id="7" name="Picture Placeholder 6"/>
-          <p:cNvSpPr>
-            <a:spLocks noGrp="1"/>
-          </p:cNvSpPr>
-          <p:nvPr>
-            <p:ph type="pic" idx="1"/>
-          </p:nvPr>
-        </p:nvSpPr>
-        <p:spPr/>
-      </p:sp>
-      <p:pic>
-        <p:nvPicPr>
-          <p:cNvPr id="9" name="Picture 8"/>
-          <p:cNvPicPr>
-            <a:picLocks noChangeAspect="1"/>
-          </p:cNvPicPr>
-          <p:nvPr/>
-        </p:nvPicPr>
-        <p:blipFill>
-          <a:blip r:embed="rId3"/>
-          <a:stretch>
-            <a:fillRect/>
-          </a:stretch>
-        </p:blipFill>
+          <a:bodyPr>
+            <a:noAutofit/>
+          </a:bodyPr>
+          <a:lstStyle/>
+          <a:p>
+            <a:r>
+              <a:rPr lang="en-US" sz="5400" dirty="0"/>
+              <a:t>https://</a:t>
+            </a:r>
+            <a:r>
+              <a:rPr lang="en-US" sz="5400" dirty="0" smtClean="0"/>
+              <a:t>forge.puppetlabs.com/supported</a:t>
+            </a:r>
+            <a:endParaRPr lang="en-US" sz="5400" dirty="0"/>
+          </a:p>
+        </p:txBody>
+      </p:sp>
+      <p:sp>
+        <p:nvSpPr>
+          <p:cNvPr id="6" name="Content Placeholder 5"/>
+          <p:cNvSpPr>
+            <a:spLocks noGrp="1"/>
+          </p:cNvSpPr>
+          <p:nvPr>
+            <p:ph idx="1"/>
+          </p:nvPr>
+        </p:nvSpPr>
         <p:spPr>
           <a:xfrm>
-            <a:off x="954164" y="0"/>
-            <a:ext cx="10170895" cy="5330952"/>
+            <a:off x="676656" y="2011680"/>
+            <a:ext cx="10753725" cy="4515244"/>
           </a:xfrm>
-          <a:prstGeom prst="rect">
-            <a:avLst/>
-          </a:prstGeom>
         </p:spPr>
-      </p:pic>
+        <p:txBody>
+          <a:bodyPr>
+            <a:normAutofit/>
+          </a:bodyPr>
+          <a:lstStyle/>
+          <a:p>
+            <a:pPr marL="0" indent="0" fontAlgn="base">
+              <a:buNone/>
+            </a:pPr>
+            <a:r>
+              <a:rPr lang="en-US" sz="3600" b="1" dirty="0"/>
+              <a:t>Puppet Labs guarantees that each supported </a:t>
+            </a:r>
+            <a:r>
+              <a:rPr lang="en-US" sz="3600" b="1" dirty="0" smtClean="0"/>
+              <a:t>module…</a:t>
+            </a:r>
+          </a:p>
+          <a:p>
+            <a:pPr marL="0" indent="0" fontAlgn="base">
+              <a:buNone/>
+            </a:pPr>
+            <a:r>
+              <a:rPr lang="en-US" sz="2800" b="1" dirty="0"/>
+              <a:t>	</a:t>
+            </a:r>
+            <a:r>
+              <a:rPr lang="en-US" sz="2800" b="1" dirty="0" smtClean="0"/>
+              <a:t>…Has </a:t>
+            </a:r>
+            <a:r>
+              <a:rPr lang="en-US" sz="2800" b="1" dirty="0"/>
+              <a:t>been </a:t>
+            </a:r>
+            <a:r>
+              <a:rPr lang="en-US" sz="2800" b="1" dirty="0">
+                <a:hlinkClick r:id="rId2"/>
+              </a:rPr>
+              <a:t>tested</a:t>
+            </a:r>
+            <a:r>
+              <a:rPr lang="en-US" sz="2800" b="1" dirty="0"/>
+              <a:t> with Puppet Enterprise</a:t>
+            </a:r>
+          </a:p>
+          <a:p>
+            <a:pPr marL="0" indent="0" fontAlgn="base">
+              <a:buNone/>
+            </a:pPr>
+            <a:r>
+              <a:rPr lang="en-US" sz="2800" b="1" dirty="0" smtClean="0"/>
+              <a:t>	…Is </a:t>
+            </a:r>
+            <a:r>
+              <a:rPr lang="en-US" sz="2800" b="1" dirty="0"/>
+              <a:t>subject to official Puppet Labs </a:t>
+            </a:r>
+            <a:r>
+              <a:rPr lang="en-US" sz="2800" b="1" dirty="0">
+                <a:hlinkClick r:id="rId3"/>
+              </a:rPr>
+              <a:t>Puppet Enterprise support</a:t>
+            </a:r>
+            <a:endParaRPr lang="en-US" sz="2800" b="1" dirty="0"/>
+          </a:p>
+          <a:p>
+            <a:pPr marL="0" indent="0" fontAlgn="base">
+              <a:buNone/>
+            </a:pPr>
+            <a:r>
+              <a:rPr lang="en-US" sz="2800" b="1" dirty="0" smtClean="0"/>
+              <a:t>	…Will </a:t>
+            </a:r>
+            <a:r>
+              <a:rPr lang="en-US" sz="2800" b="1" dirty="0"/>
+              <a:t>be maintained </a:t>
+            </a:r>
+            <a:r>
+              <a:rPr lang="en-US" sz="2800" b="1" dirty="0" smtClean="0"/>
+              <a:t>with </a:t>
+            </a:r>
+            <a:r>
+              <a:rPr lang="en-US" sz="2800" b="1" dirty="0"/>
+              <a:t>bug or security patches as </a:t>
+            </a:r>
+            <a:r>
+              <a:rPr lang="en-US" sz="2800" b="1" dirty="0" smtClean="0"/>
+              <a:t>necessary</a:t>
+            </a:r>
+          </a:p>
+          <a:p>
+            <a:pPr marL="0" indent="0" fontAlgn="base">
+              <a:buNone/>
+            </a:pPr>
+            <a:r>
+              <a:rPr lang="en-US" sz="2800" b="1" dirty="0"/>
+              <a:t>	</a:t>
+            </a:r>
+            <a:r>
+              <a:rPr lang="en-US" sz="2800" b="1" dirty="0" smtClean="0"/>
+              <a:t>…Is </a:t>
+            </a:r>
+            <a:r>
+              <a:rPr lang="en-US" sz="2800" b="1" dirty="0"/>
+              <a:t>tested on and ensured compatible with </a:t>
+            </a:r>
+            <a:r>
+              <a:rPr lang="en-US" sz="2800" b="1" dirty="0">
+                <a:hlinkClick r:id="rId4"/>
+              </a:rPr>
+              <a:t>multiple platforms</a:t>
+            </a:r>
+            <a:endParaRPr lang="en-US" sz="2800" b="1" dirty="0"/>
+          </a:p>
+          <a:p>
+            <a:endParaRPr lang="en-US" sz="3600" dirty="0"/>
+          </a:p>
+        </p:txBody>
+      </p:sp>
     </p:spTree>
     <p:extLst>
       <p:ext uri="{BB962C8B-B14F-4D97-AF65-F5344CB8AC3E}">
-        <p14:creationId xmlns:p14="http://schemas.microsoft.com/office/powerpoint/2010/main" val="1230917577"/>
+        <p14:creationId xmlns:p14="http://schemas.microsoft.com/office/powerpoint/2010/main" val="3730718376"/>
       </p:ext>
     </p:extLst>
   </p:cSld>
@@ -8259,7 +8589,7 @@
       </p:grpSpPr>
       <p:sp>
         <p:nvSpPr>
-          <p:cNvPr id="2" name="Title 1"/>
+          <p:cNvPr id="4" name="Title 3"/>
           <p:cNvSpPr>
             <a:spLocks noGrp="1"/>
           </p:cNvSpPr>
@@ -8267,84 +8597,45 @@
             <p:ph type="title"/>
           </p:nvPr>
         </p:nvSpPr>
-        <p:spPr/>
+        <p:spPr>
+          <a:xfrm>
+            <a:off x="649224" y="5418667"/>
+            <a:ext cx="10780776" cy="1234381"/>
+          </a:xfrm>
+        </p:spPr>
         <p:txBody>
           <a:bodyPr/>
           <a:lstStyle/>
           <a:p>
             <a:r>
-              <a:rPr lang="en-US" dirty="0" smtClean="0"/>
-              <a:t>Find Modules</a:t>
-            </a:r>
-            <a:endParaRPr lang="en-US" dirty="0"/>
-          </a:p>
-        </p:txBody>
-      </p:sp>
-      <p:sp>
-        <p:nvSpPr>
-          <p:cNvPr id="3" name="Content Placeholder 2"/>
-          <p:cNvSpPr>
-            <a:spLocks noGrp="1"/>
-          </p:cNvSpPr>
-          <p:nvPr>
-            <p:ph idx="1"/>
-          </p:nvPr>
-        </p:nvSpPr>
-        <p:spPr/>
-        <p:txBody>
-          <a:bodyPr>
-            <a:normAutofit/>
-          </a:bodyPr>
-          <a:lstStyle/>
-          <a:p>
-            <a:pPr marL="0" indent="0">
-              <a:buNone/>
-            </a:pPr>
-            <a:r>
-              <a:rPr lang="en-US" sz="3200" b="1" dirty="0" smtClean="0"/>
-              <a:t>Search the Puppet Forge from the command line too:</a:t>
-            </a:r>
-          </a:p>
-          <a:p>
-            <a:pPr marL="0" indent="0">
-              <a:buNone/>
-            </a:pPr>
-            <a:r>
-              <a:rPr lang="en-US" sz="3200" b="1" dirty="0">
-                <a:latin typeface="Courier New" panose="02070309020205020404" pitchFamily="49" charset="0"/>
-                <a:cs typeface="Courier New" panose="02070309020205020404" pitchFamily="49" charset="0"/>
-              </a:rPr>
-              <a:t>	</a:t>
-            </a:r>
-            <a:r>
-              <a:rPr lang="en-US" sz="3200" b="1" dirty="0" smtClean="0">
-                <a:latin typeface="Courier New" panose="02070309020205020404" pitchFamily="49" charset="0"/>
-                <a:cs typeface="Courier New" panose="02070309020205020404" pitchFamily="49" charset="0"/>
-              </a:rPr>
-              <a:t>$ puppet module search apache</a:t>
+              <a:rPr lang="en-US" b="1" dirty="0" smtClean="0"/>
+              <a:t>Latest Support Modules Listed on </a:t>
+            </a:r>
+            <a:r>
+              <a:rPr lang="en-US" b="1" dirty="0"/>
+              <a:t>https://forge.puppetlabs.com/supported</a:t>
             </a:r>
           </a:p>
         </p:txBody>
       </p:sp>
       <p:pic>
         <p:nvPicPr>
-          <p:cNvPr id="5" name="Picture 4"/>
+          <p:cNvPr id="7" name="Picture Placeholder 6"/>
           <p:cNvPicPr>
-            <a:picLocks noChangeAspect="1"/>
+            <a:picLocks noGrp="1" noChangeAspect="1"/>
           </p:cNvPicPr>
-          <p:nvPr/>
+          <p:nvPr>
+            <p:ph type="pic" idx="1"/>
+          </p:nvPr>
         </p:nvPicPr>
         <p:blipFill>
-          <a:blip r:embed="rId3"/>
+          <a:blip r:embed="rId2"/>
+          <a:srcRect l="1194" r="1194"/>
           <a:stretch>
             <a:fillRect/>
           </a:stretch>
         </p:blipFill>
         <p:spPr>
-          <a:xfrm>
-            <a:off x="687952" y="3429000"/>
-            <a:ext cx="10711317" cy="2117671"/>
-          </a:xfrm>
           <a:prstGeom prst="rect">
             <a:avLst/>
           </a:prstGeom>
@@ -8353,7 +8644,7 @@
     </p:spTree>
     <p:extLst>
       <p:ext uri="{BB962C8B-B14F-4D97-AF65-F5344CB8AC3E}">
-        <p14:creationId xmlns:p14="http://schemas.microsoft.com/office/powerpoint/2010/main" val="482773262"/>
+        <p14:creationId xmlns:p14="http://schemas.microsoft.com/office/powerpoint/2010/main" val="1067452289"/>
       </p:ext>
     </p:extLst>
   </p:cSld>
@@ -8403,110 +8694,72 @@
           <a:lstStyle/>
           <a:p>
             <a:r>
-              <a:rPr lang="en-US" dirty="0" smtClean="0"/>
-              <a:t>Install Modules</a:t>
-            </a:r>
-            <a:endParaRPr lang="en-US" dirty="0"/>
-          </a:p>
-        </p:txBody>
-      </p:sp>
-      <p:sp>
-        <p:nvSpPr>
-          <p:cNvPr id="3" name="Content Placeholder 2"/>
-          <p:cNvSpPr>
-            <a:spLocks noGrp="1"/>
-          </p:cNvSpPr>
-          <p:nvPr>
-            <p:ph idx="1"/>
-          </p:nvPr>
-        </p:nvSpPr>
-        <p:spPr/>
-        <p:txBody>
-          <a:bodyPr>
-            <a:normAutofit/>
-          </a:bodyPr>
-          <a:lstStyle/>
-          <a:p>
-            <a:pPr marL="0" indent="0">
-              <a:buNone/>
-            </a:pPr>
-            <a:r>
-              <a:rPr lang="en-US" sz="3200" b="1" dirty="0" smtClean="0"/>
-              <a:t>Use the puppet command with “module install &lt;module name&gt;”</a:t>
-            </a:r>
-          </a:p>
-          <a:p>
-            <a:pPr marL="0" indent="0">
-              <a:buNone/>
-            </a:pPr>
-            <a:r>
-              <a:rPr lang="en-US" sz="2800" b="1" dirty="0" smtClean="0">
-                <a:latin typeface="Courier New" panose="02070309020205020404" pitchFamily="49" charset="0"/>
-                <a:cs typeface="Courier New" panose="02070309020205020404" pitchFamily="49" charset="0"/>
-              </a:rPr>
-              <a:t>	# puppet module install </a:t>
-            </a:r>
-            <a:r>
-              <a:rPr lang="en-US" sz="2800" b="1" dirty="0" err="1" smtClean="0">
-                <a:latin typeface="Courier New" panose="02070309020205020404" pitchFamily="49" charset="0"/>
-                <a:cs typeface="Courier New" panose="02070309020205020404" pitchFamily="49" charset="0"/>
-              </a:rPr>
-              <a:t>puppetlabs</a:t>
-            </a:r>
-            <a:r>
-              <a:rPr lang="en-US" sz="2800" b="1" dirty="0" smtClean="0">
-                <a:latin typeface="Courier New" panose="02070309020205020404" pitchFamily="49" charset="0"/>
-                <a:cs typeface="Courier New" panose="02070309020205020404" pitchFamily="49" charset="0"/>
-              </a:rPr>
-              <a:t>-apache</a:t>
-            </a:r>
-          </a:p>
-          <a:p>
-            <a:endParaRPr lang="en-US" sz="3200" b="1" dirty="0" smtClean="0"/>
-          </a:p>
-          <a:p>
-            <a:pPr marL="0" indent="0">
-              <a:buNone/>
-            </a:pPr>
-            <a:r>
-              <a:rPr lang="en-US" sz="3200" b="1" dirty="0" smtClean="0"/>
-              <a:t>Installation locations:</a:t>
-            </a:r>
-            <a:endParaRPr lang="en-US" sz="3200" b="1" dirty="0"/>
-          </a:p>
-          <a:p>
-            <a:pPr marL="4572" lvl="1" indent="0">
-              <a:buNone/>
-            </a:pPr>
-            <a:r>
-              <a:rPr lang="en-US" sz="3200" b="1" dirty="0" smtClean="0"/>
-              <a:t>	Root – /</a:t>
-            </a:r>
-            <a:r>
-              <a:rPr lang="en-US" sz="3200" b="1" dirty="0" err="1" smtClean="0"/>
-              <a:t>etc</a:t>
-            </a:r>
-            <a:r>
-              <a:rPr lang="en-US" sz="3200" b="1" dirty="0" smtClean="0"/>
-              <a:t>/puppet/modules</a:t>
-            </a:r>
-          </a:p>
-          <a:p>
-            <a:pPr marL="0" indent="0">
-              <a:buNone/>
-            </a:pPr>
-            <a:r>
-              <a:rPr lang="en-US" sz="3200" b="1" dirty="0" smtClean="0"/>
-              <a:t>	User – /home/username/.puppet/modules</a:t>
-            </a:r>
-            <a:endParaRPr lang="en-US" sz="3200" b="1" dirty="0"/>
-          </a:p>
-        </p:txBody>
-      </p:sp>
+              <a:rPr lang="en-US" b="1" dirty="0" smtClean="0"/>
+              <a:t>Find Modules – Check compatibility and installation details</a:t>
+            </a:r>
+            <a:endParaRPr lang="en-US" b="1" dirty="0"/>
+          </a:p>
+        </p:txBody>
+      </p:sp>
+      <p:sp>
+        <p:nvSpPr>
+          <p:cNvPr id="4" name="Text Placeholder 3"/>
+          <p:cNvSpPr>
+            <a:spLocks noGrp="1"/>
+          </p:cNvSpPr>
+          <p:nvPr>
+            <p:ph type="body" sz="half" idx="2"/>
+          </p:nvPr>
+        </p:nvSpPr>
+        <p:spPr/>
+        <p:txBody>
+          <a:bodyPr/>
+          <a:lstStyle/>
+          <a:p>
+            <a:endParaRPr lang="en-US"/>
+          </a:p>
+        </p:txBody>
+      </p:sp>
+      <p:sp>
+        <p:nvSpPr>
+          <p:cNvPr id="7" name="Picture Placeholder 6"/>
+          <p:cNvSpPr>
+            <a:spLocks noGrp="1"/>
+          </p:cNvSpPr>
+          <p:nvPr>
+            <p:ph type="pic" idx="1"/>
+          </p:nvPr>
+        </p:nvSpPr>
+        <p:spPr/>
+      </p:sp>
+      <p:pic>
+        <p:nvPicPr>
+          <p:cNvPr id="9" name="Picture 8"/>
+          <p:cNvPicPr>
+            <a:picLocks noChangeAspect="1"/>
+          </p:cNvPicPr>
+          <p:nvPr/>
+        </p:nvPicPr>
+        <p:blipFill>
+          <a:blip r:embed="rId3"/>
+          <a:stretch>
+            <a:fillRect/>
+          </a:stretch>
+        </p:blipFill>
+        <p:spPr>
+          <a:xfrm>
+            <a:off x="954164" y="0"/>
+            <a:ext cx="10170895" cy="5330952"/>
+          </a:xfrm>
+          <a:prstGeom prst="rect">
+            <a:avLst/>
+          </a:prstGeom>
+        </p:spPr>
+      </p:pic>
     </p:spTree>
     <p:extLst>
       <p:ext uri="{BB962C8B-B14F-4D97-AF65-F5344CB8AC3E}">
-        <p14:creationId xmlns:p14="http://schemas.microsoft.com/office/powerpoint/2010/main" val="3085457245"/>
+        <p14:creationId xmlns:p14="http://schemas.microsoft.com/office/powerpoint/2010/main" val="1230917577"/>
       </p:ext>
     </p:extLst>
   </p:cSld>

</xml_diff>